<commit_message>
add 20465 and  update 20277
</commit_message>
<xml_diff>
--- a/20277 Database systems/Entity–relationship model.pptx
+++ b/20277 Database systems/Entity–relationship model.pptx
@@ -19,18 +19,18 @@
     <p:sldId id="265" r:id="rId13"/>
     <p:sldId id="266" r:id="rId14"/>
     <p:sldId id="267" r:id="rId15"/>
-    <p:sldId id="268" r:id="rId16"/>
-    <p:sldId id="269" r:id="rId17"/>
-    <p:sldId id="270" r:id="rId18"/>
-    <p:sldId id="272" r:id="rId19"/>
-    <p:sldId id="273" r:id="rId20"/>
-    <p:sldId id="274" r:id="rId21"/>
-    <p:sldId id="275" r:id="rId22"/>
-    <p:sldId id="276" r:id="rId23"/>
-    <p:sldId id="278" r:id="rId24"/>
-    <p:sldId id="277" r:id="rId25"/>
-    <p:sldId id="279" r:id="rId26"/>
-    <p:sldId id="280" r:id="rId27"/>
+    <p:sldId id="294" r:id="rId16"/>
+    <p:sldId id="268" r:id="rId17"/>
+    <p:sldId id="269" r:id="rId18"/>
+    <p:sldId id="270" r:id="rId19"/>
+    <p:sldId id="272" r:id="rId20"/>
+    <p:sldId id="273" r:id="rId21"/>
+    <p:sldId id="274" r:id="rId22"/>
+    <p:sldId id="275" r:id="rId23"/>
+    <p:sldId id="276" r:id="rId24"/>
+    <p:sldId id="278" r:id="rId25"/>
+    <p:sldId id="277" r:id="rId26"/>
+    <p:sldId id="279" r:id="rId27"/>
     <p:sldId id="281" r:id="rId28"/>
     <p:sldId id="282" r:id="rId29"/>
     <p:sldId id="284" r:id="rId30"/>
@@ -40,7 +40,13 @@
     <p:sldId id="288" r:id="rId34"/>
     <p:sldId id="289" r:id="rId35"/>
     <p:sldId id="291" r:id="rId36"/>
-    <p:sldId id="283" r:id="rId37"/>
+    <p:sldId id="292" r:id="rId37"/>
+    <p:sldId id="293" r:id="rId38"/>
+    <p:sldId id="295" r:id="rId39"/>
+    <p:sldId id="296" r:id="rId40"/>
+    <p:sldId id="297" r:id="rId41"/>
+    <p:sldId id="298" r:id="rId42"/>
+    <p:sldId id="283" r:id="rId43"/>
   </p:sldIdLst>
   <p:sldSz cx="9144000" cy="6858000" type="screen4x3"/>
   <p:notesSz cx="6858000" cy="9144000"/>
@@ -323,7 +329,7 @@
           <a:p>
             <a:fld id="{B8D424F6-672F-44CD-B8CC-8CC8131D8951}" type="datetimeFigureOut">
               <a:rPr lang="en-US" smtClean="0"/>
-              <a:t>5/5/2016</a:t>
+              <a:t>5/6/2016</a:t>
             </a:fld>
             <a:endParaRPr lang="en-US"/>
           </a:p>
@@ -493,7 +499,7 @@
           <a:p>
             <a:fld id="{B8D424F6-672F-44CD-B8CC-8CC8131D8951}" type="datetimeFigureOut">
               <a:rPr lang="en-US" smtClean="0"/>
-              <a:t>5/5/2016</a:t>
+              <a:t>5/6/2016</a:t>
             </a:fld>
             <a:endParaRPr lang="en-US"/>
           </a:p>
@@ -673,7 +679,7 @@
           <a:p>
             <a:fld id="{B8D424F6-672F-44CD-B8CC-8CC8131D8951}" type="datetimeFigureOut">
               <a:rPr lang="en-US" smtClean="0"/>
-              <a:t>5/5/2016</a:t>
+              <a:t>5/6/2016</a:t>
             </a:fld>
             <a:endParaRPr lang="en-US"/>
           </a:p>
@@ -843,7 +849,7 @@
           <a:p>
             <a:fld id="{B8D424F6-672F-44CD-B8CC-8CC8131D8951}" type="datetimeFigureOut">
               <a:rPr lang="en-US" smtClean="0"/>
-              <a:t>5/5/2016</a:t>
+              <a:t>5/6/2016</a:t>
             </a:fld>
             <a:endParaRPr lang="en-US"/>
           </a:p>
@@ -1089,7 +1095,7 @@
           <a:p>
             <a:fld id="{B8D424F6-672F-44CD-B8CC-8CC8131D8951}" type="datetimeFigureOut">
               <a:rPr lang="en-US" smtClean="0"/>
-              <a:t>5/5/2016</a:t>
+              <a:t>5/6/2016</a:t>
             </a:fld>
             <a:endParaRPr lang="en-US"/>
           </a:p>
@@ -1377,7 +1383,7 @@
           <a:p>
             <a:fld id="{B8D424F6-672F-44CD-B8CC-8CC8131D8951}" type="datetimeFigureOut">
               <a:rPr lang="en-US" smtClean="0"/>
-              <a:t>5/5/2016</a:t>
+              <a:t>5/6/2016</a:t>
             </a:fld>
             <a:endParaRPr lang="en-US"/>
           </a:p>
@@ -1799,7 +1805,7 @@
           <a:p>
             <a:fld id="{B8D424F6-672F-44CD-B8CC-8CC8131D8951}" type="datetimeFigureOut">
               <a:rPr lang="en-US" smtClean="0"/>
-              <a:t>5/5/2016</a:t>
+              <a:t>5/6/2016</a:t>
             </a:fld>
             <a:endParaRPr lang="en-US"/>
           </a:p>
@@ -1917,7 +1923,7 @@
           <a:p>
             <a:fld id="{B8D424F6-672F-44CD-B8CC-8CC8131D8951}" type="datetimeFigureOut">
               <a:rPr lang="en-US" smtClean="0"/>
-              <a:t>5/5/2016</a:t>
+              <a:t>5/6/2016</a:t>
             </a:fld>
             <a:endParaRPr lang="en-US"/>
           </a:p>
@@ -2012,7 +2018,7 @@
           <a:p>
             <a:fld id="{B8D424F6-672F-44CD-B8CC-8CC8131D8951}" type="datetimeFigureOut">
               <a:rPr lang="en-US" smtClean="0"/>
-              <a:t>5/5/2016</a:t>
+              <a:t>5/6/2016</a:t>
             </a:fld>
             <a:endParaRPr lang="en-US"/>
           </a:p>
@@ -2289,7 +2295,7 @@
           <a:p>
             <a:fld id="{B8D424F6-672F-44CD-B8CC-8CC8131D8951}" type="datetimeFigureOut">
               <a:rPr lang="en-US" smtClean="0"/>
-              <a:t>5/5/2016</a:t>
+              <a:t>5/6/2016</a:t>
             </a:fld>
             <a:endParaRPr lang="en-US"/>
           </a:p>
@@ -2542,7 +2548,7 @@
           <a:p>
             <a:fld id="{B8D424F6-672F-44CD-B8CC-8CC8131D8951}" type="datetimeFigureOut">
               <a:rPr lang="en-US" smtClean="0"/>
-              <a:t>5/5/2016</a:t>
+              <a:t>5/6/2016</a:t>
             </a:fld>
             <a:endParaRPr lang="en-US"/>
           </a:p>
@@ -2755,7 +2761,7 @@
           <a:p>
             <a:fld id="{B8D424F6-672F-44CD-B8CC-8CC8131D8951}" type="datetimeFigureOut">
               <a:rPr lang="en-US" smtClean="0"/>
-              <a:t>5/5/2016</a:t>
+              <a:t>5/6/2016</a:t>
             </a:fld>
             <a:endParaRPr lang="en-US"/>
           </a:p>
@@ -3199,6 +3205,13 @@
   <p:clrMapOvr>
     <a:masterClrMapping/>
   </p:clrMapOvr>
+  <p:timing>
+    <p:tnLst>
+      <p:par>
+        <p:cTn id="1" dur="indefinite" restart="never" nodeType="tmRoot"/>
+      </p:par>
+    </p:tnLst>
+  </p:timing>
 </p:sld>
 </file>
 
@@ -3530,6 +3543,13 @@
   <p:clrMapOvr>
     <a:masterClrMapping/>
   </p:clrMapOvr>
+  <p:timing>
+    <p:tnLst>
+      <p:par>
+        <p:cTn id="1" dur="indefinite" restart="never" nodeType="tmRoot"/>
+      </p:par>
+    </p:tnLst>
+  </p:timing>
 </p:sld>
 </file>
 
@@ -3695,6 +3715,13 @@
   <p:clrMapOvr>
     <a:masterClrMapping/>
   </p:clrMapOvr>
+  <p:timing>
+    <p:tnLst>
+      <p:par>
+        <p:cTn id="1" dur="indefinite" restart="never" nodeType="tmRoot"/>
+      </p:par>
+    </p:tnLst>
+  </p:timing>
 </p:sld>
 </file>
 
@@ -3943,7 +3970,7 @@
             <a:pPr algn="r" rtl="1"/>
             <a:r>
               <a:rPr lang="en-US" dirty="0" smtClean="0"/>
-              <a:t>Participation  - Total or partial</a:t>
+              <a:t>Participation constrain  - Total or partial</a:t>
             </a:r>
             <a:endParaRPr lang="he-IL" dirty="0" smtClean="0"/>
           </a:p>
@@ -3951,7 +3978,11 @@
             <a:pPr algn="r" rtl="1"/>
             <a:r>
               <a:rPr lang="he-IL" dirty="0" smtClean="0"/>
-              <a:t>לדוגמא – כל סטודנט חייב יועץ  ולכן ה </a:t>
+              <a:t>לדוגמא </a:t>
+            </a:r>
+            <a:r>
+              <a:rPr lang="he-IL" dirty="0" smtClean="0"/>
+              <a:t>– כל סטודנט חייב יועץ  ולכן ה </a:t>
             </a:r>
             <a:r>
               <a:rPr lang="en-US" dirty="0" smtClean="0"/>
@@ -4024,6 +4055,192 @@
         </p:nvSpPr>
         <p:spPr/>
         <p:txBody>
+          <a:bodyPr>
+            <a:normAutofit fontScale="90000"/>
+          </a:bodyPr>
+          <a:lstStyle/>
+          <a:p>
+            <a:r>
+              <a:rPr lang="en-US" dirty="0"/>
+              <a:t>Participation Constraints</a:t>
+            </a:r>
+            <a:br>
+              <a:rPr lang="en-US" dirty="0"/>
+            </a:br>
+            <a:r>
+              <a:rPr lang="he-IL" dirty="0" smtClean="0"/>
+              <a:t>המשך</a:t>
+            </a:r>
+            <a:endParaRPr lang="en-US" dirty="0"/>
+          </a:p>
+        </p:txBody>
+      </p:sp>
+      <p:sp>
+        <p:nvSpPr>
+          <p:cNvPr id="3" name="Content Placeholder 2"/>
+          <p:cNvSpPr>
+            <a:spLocks noGrp="1"/>
+          </p:cNvSpPr>
+          <p:nvPr>
+            <p:ph idx="1"/>
+          </p:nvPr>
+        </p:nvSpPr>
+        <p:spPr/>
+        <p:txBody>
+          <a:bodyPr>
+            <a:normAutofit/>
+          </a:bodyPr>
+          <a:lstStyle/>
+          <a:p>
+            <a:r>
+              <a:rPr lang="en-US" sz="2400" b="1" dirty="0"/>
+              <a:t>Total Participation</a:t>
+            </a:r>
+            <a:r>
+              <a:rPr lang="en-US" sz="2400" dirty="0"/>
+              <a:t> − Each entity is involved in the relationship. Total participation is represented by </a:t>
+            </a:r>
+            <a:r>
+              <a:rPr lang="en-US" sz="2400" b="1" dirty="0">
+                <a:solidFill>
+                  <a:srgbClr val="FF0000"/>
+                </a:solidFill>
+              </a:rPr>
+              <a:t>double lines</a:t>
+            </a:r>
+            <a:r>
+              <a:rPr lang="en-US" sz="2400" dirty="0"/>
+              <a:t>.</a:t>
+            </a:r>
+          </a:p>
+          <a:p>
+            <a:r>
+              <a:rPr lang="en-US" sz="2400" b="1" dirty="0"/>
+              <a:t>Partial participation</a:t>
+            </a:r>
+            <a:r>
+              <a:rPr lang="en-US" sz="2400" dirty="0"/>
+              <a:t> − Not all entities are involved in the relationship. Partial participation is represented by single lines.</a:t>
+            </a:r>
+          </a:p>
+          <a:p>
+            <a:endParaRPr lang="en-US" sz="2400" dirty="0"/>
+          </a:p>
+        </p:txBody>
+      </p:sp>
+      <p:pic>
+        <p:nvPicPr>
+          <p:cNvPr id="3074" name="Picture 2"/>
+          <p:cNvPicPr>
+            <a:picLocks noChangeAspect="1" noChangeArrowheads="1"/>
+          </p:cNvPicPr>
+          <p:nvPr/>
+        </p:nvPicPr>
+        <p:blipFill>
+          <a:blip r:embed="rId2">
+            <a:extLst>
+              <a:ext uri="{28A0092B-C50C-407E-A947-70E740481C1C}">
+                <a14:useLocalDpi xmlns:a14="http://schemas.microsoft.com/office/drawing/2010/main" val="0"/>
+              </a:ext>
+            </a:extLst>
+          </a:blip>
+          <a:srcRect/>
+          <a:stretch>
+            <a:fillRect/>
+          </a:stretch>
+        </p:blipFill>
+        <p:spPr bwMode="auto">
+          <a:xfrm>
+            <a:off x="1600200" y="4343400"/>
+            <a:ext cx="5572125" cy="1476375"/>
+          </a:xfrm>
+          <a:prstGeom prst="rect">
+            <a:avLst/>
+          </a:prstGeom>
+          <a:noFill/>
+          <a:ln>
+            <a:noFill/>
+          </a:ln>
+          <a:effectLst/>
+          <a:extLst>
+            <a:ext uri="{909E8E84-426E-40DD-AFC4-6F175D3DCCD1}">
+              <a14:hiddenFill xmlns:a14="http://schemas.microsoft.com/office/drawing/2010/main">
+                <a:solidFill>
+                  <a:schemeClr val="accent1"/>
+                </a:solidFill>
+              </a14:hiddenFill>
+            </a:ext>
+            <a:ext uri="{91240B29-F687-4F45-9708-019B960494DF}">
+              <a14:hiddenLine xmlns:a14="http://schemas.microsoft.com/office/drawing/2010/main" w="9525">
+                <a:solidFill>
+                  <a:schemeClr val="tx1"/>
+                </a:solidFill>
+                <a:miter lim="800000"/>
+                <a:headEnd/>
+                <a:tailEnd/>
+              </a14:hiddenLine>
+            </a:ext>
+            <a:ext uri="{AF507438-7753-43E0-B8FC-AC1667EBCBE1}">
+              <a14:hiddenEffects xmlns:a14="http://schemas.microsoft.com/office/drawing/2010/main">
+                <a:effectLst>
+                  <a:outerShdw dist="35921" dir="2700000" algn="ctr" rotWithShape="0">
+                    <a:schemeClr val="bg2"/>
+                  </a:outerShdw>
+                </a:effectLst>
+              </a14:hiddenEffects>
+            </a:ext>
+          </a:extLst>
+        </p:spPr>
+      </p:pic>
+    </p:spTree>
+    <p:extLst>
+      <p:ext uri="{BB962C8B-B14F-4D97-AF65-F5344CB8AC3E}">
+        <p14:creationId xmlns:p14="http://schemas.microsoft.com/office/powerpoint/2010/main" val="3599891294"/>
+      </p:ext>
+    </p:extLst>
+  </p:cSld>
+  <p:clrMapOvr>
+    <a:masterClrMapping/>
+  </p:clrMapOvr>
+  <p:timing>
+    <p:tnLst>
+      <p:par>
+        <p:cTn id="1" dur="indefinite" restart="never" nodeType="tmRoot"/>
+      </p:par>
+    </p:tnLst>
+  </p:timing>
+</p:sld>
+</file>
+
+<file path=ppt/slides/slide16.xml><?xml version="1.0" encoding="utf-8"?>
+<p:sld xmlns:a="http://schemas.openxmlformats.org/drawingml/2006/main" xmlns:r="http://schemas.openxmlformats.org/officeDocument/2006/relationships" xmlns:p="http://schemas.openxmlformats.org/presentationml/2006/main">
+  <p:cSld>
+    <p:spTree>
+      <p:nvGrpSpPr>
+        <p:cNvPr id="1" name=""/>
+        <p:cNvGrpSpPr/>
+        <p:nvPr/>
+      </p:nvGrpSpPr>
+      <p:grpSpPr>
+        <a:xfrm>
+          <a:off x="0" y="0"/>
+          <a:ext cx="0" cy="0"/>
+          <a:chOff x="0" y="0"/>
+          <a:chExt cx="0" cy="0"/>
+        </a:xfrm>
+      </p:grpSpPr>
+      <p:sp>
+        <p:nvSpPr>
+          <p:cNvPr id="2" name="Title 1"/>
+          <p:cNvSpPr>
+            <a:spLocks noGrp="1"/>
+          </p:cNvSpPr>
+          <p:nvPr>
+            <p:ph type="title"/>
+          </p:nvPr>
+        </p:nvSpPr>
+        <p:spPr/>
+        <p:txBody>
           <a:bodyPr/>
           <a:lstStyle/>
           <a:p>
@@ -4064,10 +4281,16 @@
             </a:r>
           </a:p>
           <a:p>
-            <a:pPr algn="r" rtl="1"/>
+            <a:pPr marL="0" indent="0" algn="r" rtl="1">
+              <a:buNone/>
+            </a:pPr>
             <a:r>
               <a:rPr lang="he-IL" sz="1800" dirty="0" smtClean="0"/>
-              <a:t>מלבן גדול עם שם ה </a:t>
+              <a:t>     מלבן </a:t>
+            </a:r>
+            <a:r>
+              <a:rPr lang="he-IL" sz="1800" dirty="0" smtClean="0"/>
+              <a:t>גדול עם שם ה </a:t>
             </a:r>
             <a:r>
               <a:rPr lang="en-US" sz="1800" dirty="0" smtClean="0"/>
@@ -4260,10 +4483,17 @@
   <p:clrMapOvr>
     <a:masterClrMapping/>
   </p:clrMapOvr>
+  <p:timing>
+    <p:tnLst>
+      <p:par>
+        <p:cTn id="1" dur="indefinite" restart="never" nodeType="tmRoot"/>
+      </p:par>
+    </p:tnLst>
+  </p:timing>
 </p:sld>
 </file>
 
-<file path=ppt/slides/slide16.xml><?xml version="1.0" encoding="utf-8"?>
+<file path=ppt/slides/slide17.xml><?xml version="1.0" encoding="utf-8"?>
 <p:sld xmlns:a="http://schemas.openxmlformats.org/drawingml/2006/main" xmlns:r="http://schemas.openxmlformats.org/officeDocument/2006/relationships" xmlns:p="http://schemas.openxmlformats.org/presentationml/2006/main">
   <p:cSld>
     <p:spTree>
@@ -4535,7 +4765,7 @@
 </p:sld>
 </file>
 
-<file path=ppt/slides/slide17.xml><?xml version="1.0" encoding="utf-8"?>
+<file path=ppt/slides/slide18.xml><?xml version="1.0" encoding="utf-8"?>
 <p:sld xmlns:a="http://schemas.openxmlformats.org/drawingml/2006/main" xmlns:r="http://schemas.openxmlformats.org/officeDocument/2006/relationships" xmlns:p="http://schemas.openxmlformats.org/presentationml/2006/main">
   <p:cSld>
     <p:spTree>
@@ -4782,7 +5012,7 @@
 </p:sld>
 </file>
 
-<file path=ppt/slides/slide18.xml><?xml version="1.0" encoding="utf-8"?>
+<file path=ppt/slides/slide19.xml><?xml version="1.0" encoding="utf-8"?>
 <p:sld xmlns:a="http://schemas.openxmlformats.org/drawingml/2006/main" xmlns:r="http://schemas.openxmlformats.org/officeDocument/2006/relationships" xmlns:p="http://schemas.openxmlformats.org/presentationml/2006/main">
   <p:cSld>
     <p:spTree>
@@ -4839,7 +5069,7 @@
         <p:spPr/>
         <p:txBody>
           <a:bodyPr>
-            <a:normAutofit lnSpcReduction="10000"/>
+            <a:normAutofit/>
           </a:bodyPr>
           <a:lstStyle/>
           <a:p>
@@ -4851,54 +5081,98 @@
           <a:p>
             <a:pPr algn="r" rtl="1"/>
             <a:r>
-              <a:rPr lang="he-IL" dirty="0" smtClean="0"/>
-              <a:t>נשים לב לחץ ב </a:t>
-            </a:r>
-            <a:r>
-              <a:rPr lang="en-US" dirty="0" smtClean="0"/>
-              <a:t>instructor</a:t>
+              <a:rPr lang="he-IL" sz="1600" dirty="0" smtClean="0"/>
+              <a:t> נקרא את הסימון בצורה הבאה מימין לשמאל:</a:t>
             </a:r>
           </a:p>
           <a:p>
             <a:pPr algn="r" rtl="1"/>
             <a:r>
-              <a:rPr lang="he-IL" dirty="0" smtClean="0"/>
-              <a:t>זה אומר שמרצה אחד יכול ליעץ להרבה סטודנטים</a:t>
-            </a:r>
-          </a:p>
-          <a:p>
-            <a:pPr marL="0" indent="0" algn="r" rtl="1">
-              <a:buNone/>
-            </a:pPr>
-            <a:r>
-              <a:rPr lang="he-IL" dirty="0" smtClean="0"/>
-              <a:t>   אבל  סטודנט לא יכול לקבל יותר ממרצה אחד</a:t>
+              <a:rPr lang="he-IL" sz="1600" dirty="0" smtClean="0"/>
+              <a:t>ל – </a:t>
+            </a:r>
+            <a:r>
+              <a:rPr lang="he-IL" sz="1600" dirty="0" smtClean="0">
+                <a:solidFill>
+                  <a:schemeClr val="accent6">
+                    <a:lumMod val="75000"/>
+                  </a:schemeClr>
+                </a:solidFill>
+              </a:rPr>
+              <a:t>סטודנט</a:t>
+            </a:r>
+            <a:r>
+              <a:rPr lang="he-IL" sz="1600" dirty="0" smtClean="0"/>
+              <a:t>  יש </a:t>
+            </a:r>
+            <a:r>
+              <a:rPr lang="he-IL" sz="1600" dirty="0" smtClean="0">
+                <a:solidFill>
+                  <a:srgbClr val="92D050"/>
+                </a:solidFill>
+              </a:rPr>
+              <a:t>מרצה</a:t>
+            </a:r>
+            <a:r>
+              <a:rPr lang="he-IL" sz="1600" dirty="0" smtClean="0"/>
+              <a:t>  אחד </a:t>
             </a:r>
           </a:p>
           <a:p>
             <a:pPr algn="r" rtl="1"/>
             <a:r>
-              <a:rPr lang="he-IL" dirty="0" smtClean="0"/>
-              <a:t>אם נהפוך את הכיוון ונשים חץ על סטודנט </a:t>
-            </a:r>
-          </a:p>
-          <a:p>
-            <a:pPr marL="0" indent="0" algn="r" rtl="1">
-              <a:buNone/>
-            </a:pPr>
-            <a:r>
-              <a:rPr lang="he-IL" dirty="0" smtClean="0"/>
-              <a:t>   אז נוכל לקבוע שסטודנט יכול לקבל יעוץ מהרבה   </a:t>
-            </a:r>
-            <a:r>
-              <a:rPr lang="en-US" dirty="0" smtClean="0"/>
-              <a:t>     </a:t>
-            </a:r>
-            <a:r>
-              <a:rPr lang="he-IL" dirty="0" smtClean="0"/>
-              <a:t>מרצים אבל מרצה יכול לייעץ לסטודנט אחד.</a:t>
-            </a:r>
-            <a:endParaRPr lang="en-US" dirty="0"/>
+              <a:rPr lang="he-IL" sz="1600" dirty="0" smtClean="0"/>
+              <a:t>ומימין לשמאל:</a:t>
+            </a:r>
+          </a:p>
+          <a:p>
+            <a:pPr algn="r" rtl="1"/>
+            <a:r>
+              <a:rPr lang="he-IL" sz="1600" dirty="0" smtClean="0"/>
+              <a:t>למרצה יש הרבה סטודנטים או בכלל לא</a:t>
+            </a:r>
+          </a:p>
+          <a:p>
+            <a:pPr algn="r" rtl="1"/>
+            <a:endParaRPr lang="he-IL" sz="1600" dirty="0"/>
+          </a:p>
+          <a:p>
+            <a:pPr algn="r" rtl="1"/>
+            <a:endParaRPr lang="he-IL" sz="1600" dirty="0" smtClean="0"/>
+          </a:p>
+          <a:p>
+            <a:pPr algn="r" rtl="1"/>
+            <a:r>
+              <a:rPr lang="he-IL" sz="1600" dirty="0" smtClean="0"/>
+              <a:t> </a:t>
+            </a:r>
+            <a:r>
+              <a:rPr lang="he-IL" sz="1600" dirty="0"/>
+              <a:t>נקרא את הסימון בצורה הבאה מימין לשמאל</a:t>
+            </a:r>
+            <a:r>
+              <a:rPr lang="he-IL" sz="1600" dirty="0" smtClean="0"/>
+              <a:t>:</a:t>
+            </a:r>
+          </a:p>
+          <a:p>
+            <a:pPr algn="r" rtl="1"/>
+            <a:r>
+              <a:rPr lang="he-IL" sz="1600" dirty="0" smtClean="0"/>
+              <a:t>לסטודנט אחד יש הרבה מרצים </a:t>
+            </a:r>
+          </a:p>
+          <a:p>
+            <a:pPr algn="r" rtl="1"/>
+            <a:r>
+              <a:rPr lang="he-IL" sz="1600" dirty="0" smtClean="0"/>
+              <a:t>לכל המרצים יש סטודנט אחד או בכלל לא</a:t>
+            </a:r>
+            <a:endParaRPr lang="he-IL" sz="1600" dirty="0"/>
+          </a:p>
+          <a:p>
+            <a:pPr algn="r" rtl="1"/>
+            <a:endParaRPr lang="he-IL" sz="1600" dirty="0"/>
           </a:p>
         </p:txBody>
       </p:sp>
@@ -4966,6 +5240,70 @@
           </a:extLst>
         </p:spPr>
       </p:pic>
+      <p:pic>
+        <p:nvPicPr>
+          <p:cNvPr id="7170" name="Picture 2"/>
+          <p:cNvPicPr>
+            <a:picLocks noChangeAspect="1" noChangeArrowheads="1"/>
+          </p:cNvPicPr>
+          <p:nvPr/>
+        </p:nvPicPr>
+        <p:blipFill>
+          <a:blip r:embed="rId3">
+            <a:extLst>
+              <a:ext uri="{28A0092B-C50C-407E-A947-70E740481C1C}">
+                <a14:useLocalDpi xmlns:a14="http://schemas.microsoft.com/office/drawing/2010/main" val="0"/>
+              </a:ext>
+            </a:extLst>
+          </a:blip>
+          <a:srcRect/>
+          <a:stretch>
+            <a:fillRect/>
+          </a:stretch>
+        </p:blipFill>
+        <p:spPr bwMode="auto">
+          <a:xfrm>
+            <a:off x="533399" y="4267200"/>
+            <a:ext cx="3971925" cy="1076325"/>
+          </a:xfrm>
+          <a:prstGeom prst="rect">
+            <a:avLst/>
+          </a:prstGeom>
+          <a:noFill/>
+          <a:ln>
+            <a:noFill/>
+          </a:ln>
+          <a:effectLst/>
+          <a:extLst>
+            <a:ext uri="{909E8E84-426E-40DD-AFC4-6F175D3DCCD1}">
+              <a14:hiddenFill xmlns:a14="http://schemas.microsoft.com/office/drawing/2010/main">
+                <a:solidFill>
+                  <a:schemeClr val="accent1"/>
+                </a:solidFill>
+              </a14:hiddenFill>
+            </a:ext>
+            <a:ext uri="{91240B29-F687-4F45-9708-019B960494DF}">
+              <a14:hiddenLine xmlns:a14="http://schemas.microsoft.com/office/drawing/2010/main" w="9525">
+                <a:solidFill>
+                  <a:schemeClr val="tx1"/>
+                </a:solidFill>
+                <a:miter lim="800000"/>
+                <a:headEnd/>
+                <a:tailEnd/>
+              </a14:hiddenLine>
+            </a:ext>
+            <a:ext uri="{AF507438-7753-43E0-B8FC-AC1667EBCBE1}">
+              <a14:hiddenEffects xmlns:a14="http://schemas.microsoft.com/office/drawing/2010/main">
+                <a:effectLst>
+                  <a:outerShdw dist="35921" dir="2700000" algn="ctr" rotWithShape="0">
+                    <a:schemeClr val="bg2"/>
+                  </a:outerShdw>
+                </a:effectLst>
+              </a14:hiddenEffects>
+            </a:ext>
+          </a:extLst>
+        </p:spPr>
+      </p:pic>
     </p:spTree>
     <p:extLst>
       <p:ext uri="{BB962C8B-B14F-4D97-AF65-F5344CB8AC3E}">
@@ -4986,7 +5324,199 @@
 </p:sld>
 </file>
 
-<file path=ppt/slides/slide19.xml><?xml version="1.0" encoding="utf-8"?>
+<file path=ppt/slides/slide2.xml><?xml version="1.0" encoding="utf-8"?>
+<p:sld xmlns:a="http://schemas.openxmlformats.org/drawingml/2006/main" xmlns:r="http://schemas.openxmlformats.org/officeDocument/2006/relationships" xmlns:p="http://schemas.openxmlformats.org/presentationml/2006/main">
+  <p:cSld>
+    <p:spTree>
+      <p:nvGrpSpPr>
+        <p:cNvPr id="1" name=""/>
+        <p:cNvGrpSpPr/>
+        <p:nvPr/>
+      </p:nvGrpSpPr>
+      <p:grpSpPr>
+        <a:xfrm>
+          <a:off x="0" y="0"/>
+          <a:ext cx="0" cy="0"/>
+          <a:chOff x="0" y="0"/>
+          <a:chExt cx="0" cy="0"/>
+        </a:xfrm>
+      </p:grpSpPr>
+      <p:sp>
+        <p:nvSpPr>
+          <p:cNvPr id="2" name="Title 1"/>
+          <p:cNvSpPr>
+            <a:spLocks noGrp="1"/>
+          </p:cNvSpPr>
+          <p:nvPr>
+            <p:ph type="title"/>
+          </p:nvPr>
+        </p:nvSpPr>
+        <p:spPr/>
+        <p:txBody>
+          <a:bodyPr>
+            <a:noAutofit/>
+          </a:bodyPr>
+          <a:lstStyle/>
+          <a:p>
+            <a:r>
+              <a:rPr lang="he-IL" sz="1400" dirty="0" smtClean="0"/>
+              <a:t>חלק שני של הספר</a:t>
+            </a:r>
+            <a:r>
+              <a:rPr lang="en-US" sz="1400" dirty="0" smtClean="0"/>
+              <a:t>     </a:t>
+            </a:r>
+            <a:r>
+              <a:rPr lang="he-IL" sz="1400" dirty="0" smtClean="0"/>
+              <a:t>פרק 7</a:t>
+            </a:r>
+            <a:r>
+              <a:rPr lang="en-US" sz="1400" dirty="0" smtClean="0"/>
+              <a:t/>
+            </a:r>
+            <a:br>
+              <a:rPr lang="en-US" sz="1400" dirty="0" smtClean="0"/>
+            </a:br>
+            <a:r>
+              <a:rPr lang="en-US" sz="3200" dirty="0" smtClean="0"/>
+              <a:t>Database Design and the E-R Model</a:t>
+            </a:r>
+            <a:endParaRPr lang="en-US" sz="3200" dirty="0"/>
+          </a:p>
+        </p:txBody>
+      </p:sp>
+      <p:sp>
+        <p:nvSpPr>
+          <p:cNvPr id="3" name="Content Placeholder 2"/>
+          <p:cNvSpPr>
+            <a:spLocks noGrp="1"/>
+          </p:cNvSpPr>
+          <p:nvPr>
+            <p:ph idx="1"/>
+          </p:nvPr>
+        </p:nvSpPr>
+        <p:spPr/>
+        <p:txBody>
+          <a:bodyPr>
+            <a:normAutofit/>
+          </a:bodyPr>
+          <a:lstStyle/>
+          <a:p>
+            <a:r>
+              <a:rPr lang="en-US" sz="2000" dirty="0" smtClean="0"/>
+              <a:t>The entity-relationship (E-R)</a:t>
+            </a:r>
+            <a:r>
+              <a:rPr lang="he-IL" sz="2000" dirty="0" smtClean="0"/>
+              <a:t> </a:t>
+            </a:r>
+            <a:r>
+              <a:rPr lang="en-US" sz="2000" dirty="0" smtClean="0"/>
+              <a:t> model is a high-level data model.</a:t>
+            </a:r>
+          </a:p>
+          <a:p>
+            <a:pPr algn="r" rtl="1"/>
+            <a:r>
+              <a:rPr lang="he-IL" sz="2000" dirty="0" smtClean="0"/>
+              <a:t>המודל מפשט ומתאר את הישויות ( </a:t>
+            </a:r>
+            <a:r>
+              <a:rPr lang="en-US" sz="2000" dirty="0" smtClean="0"/>
+              <a:t>entities</a:t>
+            </a:r>
+            <a:r>
+              <a:rPr lang="he-IL" sz="2000" dirty="0" smtClean="0"/>
+              <a:t>) ואת היחסים בינהם במקום את הטבלה ותוכנה. זהו לעיתים החלק הראשון ב </a:t>
+            </a:r>
+            <a:r>
+              <a:rPr lang="en-US" sz="2000" dirty="0" smtClean="0"/>
+              <a:t>database design</a:t>
+            </a:r>
+          </a:p>
+          <a:p>
+            <a:pPr marL="0" indent="0">
+              <a:buNone/>
+            </a:pPr>
+            <a:r>
+              <a:rPr lang="en-US" sz="1400" dirty="0" smtClean="0"/>
+              <a:t>We show in this chapter how an E-R design can be transformed into a set of relation schemas and how some of the constraints can be captured in that design.</a:t>
+            </a:r>
+          </a:p>
+          <a:p>
+            <a:pPr marL="0" indent="0">
+              <a:buNone/>
+            </a:pPr>
+            <a:endParaRPr lang="en-US" sz="1400" dirty="0" smtClean="0"/>
+          </a:p>
+          <a:p>
+            <a:r>
+              <a:rPr lang="en-US" sz="1400" dirty="0" smtClean="0"/>
+              <a:t>The initial phase of database design is to characterize fully the data needs of  the prospective database users. </a:t>
+            </a:r>
+            <a:r>
+              <a:rPr lang="en-US" sz="1400" dirty="0" smtClean="0">
+                <a:solidFill>
+                  <a:srgbClr val="00B0F0"/>
+                </a:solidFill>
+              </a:rPr>
+              <a:t>user requirements.</a:t>
+            </a:r>
+          </a:p>
+          <a:p>
+            <a:r>
+              <a:rPr lang="en-US" sz="1400" dirty="0" smtClean="0">
+                <a:solidFill>
+                  <a:srgbClr val="00B0F0"/>
+                </a:solidFill>
+              </a:rPr>
+              <a:t>conceptual-design</a:t>
+            </a:r>
+            <a:r>
+              <a:rPr lang="en-US" sz="1400" dirty="0" smtClean="0"/>
+              <a:t> - The entity-relationship model, which we study in the rest of this chapter, is typically used to represent the conceptual design.</a:t>
+            </a:r>
+          </a:p>
+          <a:p>
+            <a:r>
+              <a:rPr lang="en-US" sz="1400" dirty="0" smtClean="0">
+                <a:solidFill>
+                  <a:srgbClr val="00B0F0"/>
+                </a:solidFill>
+              </a:rPr>
+              <a:t>specification of functional requirements</a:t>
+            </a:r>
+            <a:r>
+              <a:rPr lang="en-US" sz="1400" dirty="0" smtClean="0"/>
+              <a:t>:  users describe the kinds of operations (or transactions) that will be performed on the data.</a:t>
+            </a:r>
+          </a:p>
+          <a:p>
+            <a:endParaRPr lang="en-US" sz="1400" dirty="0"/>
+          </a:p>
+        </p:txBody>
+      </p:sp>
+    </p:spTree>
+    <p:extLst>
+      <p:ext uri="{BB962C8B-B14F-4D97-AF65-F5344CB8AC3E}">
+        <p14:creationId xmlns:p14="http://schemas.microsoft.com/office/powerpoint/2010/main" val="3377413763"/>
+      </p:ext>
+    </p:extLst>
+  </p:cSld>
+  <p:clrMapOvr>
+    <a:masterClrMapping/>
+  </p:clrMapOvr>
+  <p:timing>
+    <p:tnLst>
+      <p:par>
+        <p:cTn id="1" dur="indefinite" restart="never" nodeType="tmRoot"/>
+      </p:par>
+    </p:tnLst>
+  </p:timing>
+</p:sld>
+</file>
+
+<file path=ppt/slides/slide20.xml><?xml version="1.0" encoding="utf-8"?>
 <p:sld xmlns:a="http://schemas.openxmlformats.org/drawingml/2006/main" xmlns:r="http://schemas.openxmlformats.org/officeDocument/2006/relationships" xmlns:p="http://schemas.openxmlformats.org/presentationml/2006/main">
   <p:cSld>
     <p:spTree>
@@ -5170,192 +5700,7 @@
 </p:sld>
 </file>
 
-<file path=ppt/slides/slide2.xml><?xml version="1.0" encoding="utf-8"?>
-<p:sld xmlns:a="http://schemas.openxmlformats.org/drawingml/2006/main" xmlns:r="http://schemas.openxmlformats.org/officeDocument/2006/relationships" xmlns:p="http://schemas.openxmlformats.org/presentationml/2006/main">
-  <p:cSld>
-    <p:spTree>
-      <p:nvGrpSpPr>
-        <p:cNvPr id="1" name=""/>
-        <p:cNvGrpSpPr/>
-        <p:nvPr/>
-      </p:nvGrpSpPr>
-      <p:grpSpPr>
-        <a:xfrm>
-          <a:off x="0" y="0"/>
-          <a:ext cx="0" cy="0"/>
-          <a:chOff x="0" y="0"/>
-          <a:chExt cx="0" cy="0"/>
-        </a:xfrm>
-      </p:grpSpPr>
-      <p:sp>
-        <p:nvSpPr>
-          <p:cNvPr id="2" name="Title 1"/>
-          <p:cNvSpPr>
-            <a:spLocks noGrp="1"/>
-          </p:cNvSpPr>
-          <p:nvPr>
-            <p:ph type="title"/>
-          </p:nvPr>
-        </p:nvSpPr>
-        <p:spPr/>
-        <p:txBody>
-          <a:bodyPr>
-            <a:noAutofit/>
-          </a:bodyPr>
-          <a:lstStyle/>
-          <a:p>
-            <a:r>
-              <a:rPr lang="he-IL" sz="1400" dirty="0" smtClean="0"/>
-              <a:t>חלק שני של הספר</a:t>
-            </a:r>
-            <a:r>
-              <a:rPr lang="en-US" sz="1400" dirty="0" smtClean="0"/>
-              <a:t>     </a:t>
-            </a:r>
-            <a:r>
-              <a:rPr lang="he-IL" sz="1400" dirty="0" smtClean="0"/>
-              <a:t>פרק 7</a:t>
-            </a:r>
-            <a:r>
-              <a:rPr lang="en-US" sz="1400" dirty="0" smtClean="0"/>
-              <a:t/>
-            </a:r>
-            <a:br>
-              <a:rPr lang="en-US" sz="1400" dirty="0" smtClean="0"/>
-            </a:br>
-            <a:r>
-              <a:rPr lang="en-US" sz="3200" dirty="0" smtClean="0"/>
-              <a:t>Database Design and the E-R Model</a:t>
-            </a:r>
-            <a:endParaRPr lang="en-US" sz="3200" dirty="0"/>
-          </a:p>
-        </p:txBody>
-      </p:sp>
-      <p:sp>
-        <p:nvSpPr>
-          <p:cNvPr id="3" name="Content Placeholder 2"/>
-          <p:cNvSpPr>
-            <a:spLocks noGrp="1"/>
-          </p:cNvSpPr>
-          <p:nvPr>
-            <p:ph idx="1"/>
-          </p:nvPr>
-        </p:nvSpPr>
-        <p:spPr/>
-        <p:txBody>
-          <a:bodyPr>
-            <a:normAutofit/>
-          </a:bodyPr>
-          <a:lstStyle/>
-          <a:p>
-            <a:r>
-              <a:rPr lang="en-US" sz="2000" dirty="0" smtClean="0"/>
-              <a:t>The entity-relationship (E-R)</a:t>
-            </a:r>
-            <a:r>
-              <a:rPr lang="he-IL" sz="2000" dirty="0" smtClean="0"/>
-              <a:t> </a:t>
-            </a:r>
-            <a:r>
-              <a:rPr lang="en-US" sz="2000" dirty="0" smtClean="0"/>
-              <a:t> model is a high-level data model.</a:t>
-            </a:r>
-          </a:p>
-          <a:p>
-            <a:pPr algn="r" rtl="1"/>
-            <a:r>
-              <a:rPr lang="he-IL" sz="2000" dirty="0" smtClean="0"/>
-              <a:t>המודל מפשט ומתאר את הישויות ( </a:t>
-            </a:r>
-            <a:r>
-              <a:rPr lang="en-US" sz="2000" dirty="0" smtClean="0"/>
-              <a:t>entities</a:t>
-            </a:r>
-            <a:r>
-              <a:rPr lang="he-IL" sz="2000" dirty="0" smtClean="0"/>
-              <a:t>) ואת היחסים בינהם במקום את הטבלה ותוכנה. זהו לעיתים החלק הראשון ב </a:t>
-            </a:r>
-            <a:r>
-              <a:rPr lang="en-US" sz="2000" dirty="0" smtClean="0"/>
-              <a:t>database design</a:t>
-            </a:r>
-          </a:p>
-          <a:p>
-            <a:pPr marL="0" indent="0">
-              <a:buNone/>
-            </a:pPr>
-            <a:r>
-              <a:rPr lang="en-US" sz="1400" dirty="0" smtClean="0"/>
-              <a:t>We show in this chapter how an E-R design can be transformed into a set of relation schemas and how some of the constraints can be captured in that design.</a:t>
-            </a:r>
-          </a:p>
-          <a:p>
-            <a:pPr marL="0" indent="0">
-              <a:buNone/>
-            </a:pPr>
-            <a:endParaRPr lang="en-US" sz="1400" dirty="0" smtClean="0"/>
-          </a:p>
-          <a:p>
-            <a:r>
-              <a:rPr lang="en-US" sz="1400" dirty="0" smtClean="0"/>
-              <a:t>The initial phase of database design is to characterize fully the data needs of  the prospective database users. </a:t>
-            </a:r>
-            <a:r>
-              <a:rPr lang="en-US" sz="1400" dirty="0" smtClean="0">
-                <a:solidFill>
-                  <a:srgbClr val="00B0F0"/>
-                </a:solidFill>
-              </a:rPr>
-              <a:t>user requirements.</a:t>
-            </a:r>
-          </a:p>
-          <a:p>
-            <a:r>
-              <a:rPr lang="en-US" sz="1400" dirty="0" smtClean="0">
-                <a:solidFill>
-                  <a:srgbClr val="00B0F0"/>
-                </a:solidFill>
-              </a:rPr>
-              <a:t>conceptual-design</a:t>
-            </a:r>
-            <a:r>
-              <a:rPr lang="en-US" sz="1400" dirty="0" smtClean="0"/>
-              <a:t> - The entity-relationship model, which we study in the rest of this chapter, is typically used to represent the conceptual design.</a:t>
-            </a:r>
-          </a:p>
-          <a:p>
-            <a:r>
-              <a:rPr lang="en-US" sz="1400" dirty="0" smtClean="0">
-                <a:solidFill>
-                  <a:srgbClr val="00B0F0"/>
-                </a:solidFill>
-              </a:rPr>
-              <a:t>specification of functional requirements</a:t>
-            </a:r>
-            <a:r>
-              <a:rPr lang="en-US" sz="1400" dirty="0" smtClean="0"/>
-              <a:t>:  users describe the kinds of operations (or transactions) that will be performed on the data.</a:t>
-            </a:r>
-          </a:p>
-          <a:p>
-            <a:endParaRPr lang="en-US" sz="1400" dirty="0"/>
-          </a:p>
-        </p:txBody>
-      </p:sp>
-    </p:spTree>
-    <p:extLst>
-      <p:ext uri="{BB962C8B-B14F-4D97-AF65-F5344CB8AC3E}">
-        <p14:creationId xmlns:p14="http://schemas.microsoft.com/office/powerpoint/2010/main" val="3377413763"/>
-      </p:ext>
-    </p:extLst>
-  </p:cSld>
-  <p:clrMapOvr>
-    <a:masterClrMapping/>
-  </p:clrMapOvr>
-</p:sld>
-</file>
-
-<file path=ppt/slides/slide20.xml><?xml version="1.0" encoding="utf-8"?>
+<file path=ppt/slides/slide21.xml><?xml version="1.0" encoding="utf-8"?>
 <p:sld xmlns:a="http://schemas.openxmlformats.org/drawingml/2006/main" xmlns:r="http://schemas.openxmlformats.org/officeDocument/2006/relationships" xmlns:p="http://schemas.openxmlformats.org/presentationml/2006/main">
   <p:cSld>
     <p:spTree>
@@ -5567,7 +5912,7 @@
 </p:sld>
 </file>
 
-<file path=ppt/slides/slide21.xml><?xml version="1.0" encoding="utf-8"?>
+<file path=ppt/slides/slide22.xml><?xml version="1.0" encoding="utf-8"?>
 <p:sld xmlns:a="http://schemas.openxmlformats.org/drawingml/2006/main" xmlns:r="http://schemas.openxmlformats.org/officeDocument/2006/relationships" xmlns:p="http://schemas.openxmlformats.org/presentationml/2006/main">
   <p:cSld>
     <p:spTree>
@@ -5659,27 +6004,15 @@
             <a:pPr algn="r" rtl="1"/>
             <a:r>
               <a:rPr lang="en-US" sz="2000" dirty="0" smtClean="0"/>
-              <a:t>{</a:t>
-            </a:r>
-            <a:r>
-              <a:rPr lang="en-US" sz="2000" dirty="0" err="1" smtClean="0"/>
-              <a:t>phone_number</a:t>
-            </a:r>
-            <a:r>
-              <a:rPr lang="en-US" sz="2000" dirty="0" smtClean="0"/>
-              <a:t>}</a:t>
+              <a:t>{phone_number}</a:t>
             </a:r>
             <a:r>
               <a:rPr lang="he-IL" sz="2000" dirty="0" smtClean="0"/>
               <a:t> הוא </a:t>
             </a:r>
             <a:r>
-              <a:rPr lang="en-US" sz="2000" dirty="0" err="1" smtClean="0"/>
-              <a:t>multivalue</a:t>
-            </a:r>
-            <a:r>
               <a:rPr lang="en-US" sz="2000" dirty="0" smtClean="0"/>
-              <a:t> attribute</a:t>
+              <a:t>multivalue attribute</a:t>
             </a:r>
           </a:p>
           <a:p>
@@ -5702,18 +6035,13 @@
               <a:t> – עם סוגריים – מתאר </a:t>
             </a:r>
             <a:r>
-              <a:rPr lang="en-US" sz="2000" dirty="0" err="1" smtClean="0"/>
-              <a:t>dervied</a:t>
-            </a:r>
-            <a:r>
               <a:rPr lang="en-US" sz="2000" dirty="0" smtClean="0"/>
-              <a:t> </a:t>
-            </a:r>
-            <a:r>
-              <a:rPr lang="en-US" sz="2000" dirty="0" err="1" smtClean="0"/>
+              <a:t>derived </a:t>
+            </a:r>
+            <a:r>
+              <a:rPr lang="en-US" sz="2000" dirty="0" smtClean="0"/>
               <a:t>atrribute</a:t>
             </a:r>
-            <a:endParaRPr lang="en-US" sz="2000" dirty="0" smtClean="0"/>
           </a:p>
           <a:p>
             <a:pPr algn="r" rtl="1"/>
@@ -5730,10 +6058,9 @@
               <a:t> </a:t>
             </a:r>
             <a:r>
-              <a:rPr lang="en-US" sz="2000" dirty="0" err="1" smtClean="0"/>
+              <a:rPr lang="en-US" sz="2000" dirty="0" smtClean="0"/>
               <a:t>date_of_birth</a:t>
             </a:r>
-            <a:endParaRPr lang="en-US" sz="2000" dirty="0" smtClean="0"/>
           </a:p>
           <a:p>
             <a:pPr algn="r" rtl="1"/>
@@ -5829,7 +6156,7 @@
 </p:sld>
 </file>
 
-<file path=ppt/slides/slide22.xml><?xml version="1.0" encoding="utf-8"?>
+<file path=ppt/slides/slide23.xml><?xml version="1.0" encoding="utf-8"?>
 <p:sld xmlns:a="http://schemas.openxmlformats.org/drawingml/2006/main" xmlns:r="http://schemas.openxmlformats.org/officeDocument/2006/relationships" xmlns:p="http://schemas.openxmlformats.org/presentationml/2006/main">
   <p:cSld>
     <p:spTree>
@@ -5989,7 +6316,7 @@
 </p:sld>
 </file>
 
-<file path=ppt/slides/slide23.xml><?xml version="1.0" encoding="utf-8"?>
+<file path=ppt/slides/slide24.xml><?xml version="1.0" encoding="utf-8"?>
 <p:sld xmlns:a="http://schemas.openxmlformats.org/drawingml/2006/main" xmlns:r="http://schemas.openxmlformats.org/officeDocument/2006/relationships" xmlns:p="http://schemas.openxmlformats.org/presentationml/2006/main">
   <p:cSld>
     <p:spTree>
@@ -6102,7 +6429,7 @@
 </p:sld>
 </file>
 
-<file path=ppt/slides/slide24.xml><?xml version="1.0" encoding="utf-8"?>
+<file path=ppt/slides/slide25.xml><?xml version="1.0" encoding="utf-8"?>
 <p:sld xmlns:a="http://schemas.openxmlformats.org/drawingml/2006/main" xmlns:r="http://schemas.openxmlformats.org/officeDocument/2006/relationships" xmlns:p="http://schemas.openxmlformats.org/presentationml/2006/main">
   <p:cSld>
     <p:spTree>
@@ -6277,7 +6604,7 @@
 </p:sld>
 </file>
 
-<file path=ppt/slides/slide25.xml><?xml version="1.0" encoding="utf-8"?>
+<file path=ppt/slides/slide26.xml><?xml version="1.0" encoding="utf-8"?>
 <p:sld xmlns:a="http://schemas.openxmlformats.org/drawingml/2006/main" xmlns:r="http://schemas.openxmlformats.org/officeDocument/2006/relationships" xmlns:p="http://schemas.openxmlformats.org/presentationml/2006/main">
   <p:cSld>
     <p:spTree>
@@ -6574,131 +6901,6 @@
     <p:extLst>
       <p:ext uri="{BB962C8B-B14F-4D97-AF65-F5344CB8AC3E}">
         <p14:creationId xmlns:p14="http://schemas.microsoft.com/office/powerpoint/2010/main" val="2537995708"/>
-      </p:ext>
-    </p:extLst>
-  </p:cSld>
-  <p:clrMapOvr>
-    <a:masterClrMapping/>
-  </p:clrMapOvr>
-  <p:timing>
-    <p:tnLst>
-      <p:par>
-        <p:cTn id="1" dur="indefinite" restart="never" nodeType="tmRoot"/>
-      </p:par>
-    </p:tnLst>
-  </p:timing>
-</p:sld>
-</file>
-
-<file path=ppt/slides/slide26.xml><?xml version="1.0" encoding="utf-8"?>
-<p:sld xmlns:a="http://schemas.openxmlformats.org/drawingml/2006/main" xmlns:r="http://schemas.openxmlformats.org/officeDocument/2006/relationships" xmlns:p="http://schemas.openxmlformats.org/presentationml/2006/main">
-  <p:cSld>
-    <p:spTree>
-      <p:nvGrpSpPr>
-        <p:cNvPr id="1" name=""/>
-        <p:cNvGrpSpPr/>
-        <p:nvPr/>
-      </p:nvGrpSpPr>
-      <p:grpSpPr>
-        <a:xfrm>
-          <a:off x="0" y="0"/>
-          <a:ext cx="0" cy="0"/>
-          <a:chOff x="0" y="0"/>
-          <a:chExt cx="0" cy="0"/>
-        </a:xfrm>
-      </p:grpSpPr>
-      <p:sp>
-        <p:nvSpPr>
-          <p:cNvPr id="3" name="Content Placeholder 2"/>
-          <p:cNvSpPr>
-            <a:spLocks noGrp="1"/>
-          </p:cNvSpPr>
-          <p:nvPr>
-            <p:ph idx="1"/>
-          </p:nvPr>
-        </p:nvSpPr>
-        <p:spPr>
-          <a:xfrm>
-            <a:off x="457200" y="304800"/>
-            <a:ext cx="8229600" cy="5821363"/>
-          </a:xfrm>
-        </p:spPr>
-        <p:txBody>
-          <a:bodyPr/>
-          <a:lstStyle/>
-          <a:p>
-            <a:endParaRPr lang="en-US" dirty="0"/>
-          </a:p>
-        </p:txBody>
-      </p:sp>
-      <p:pic>
-        <p:nvPicPr>
-          <p:cNvPr id="16386" name="Picture 2"/>
-          <p:cNvPicPr>
-            <a:picLocks noChangeAspect="1" noChangeArrowheads="1"/>
-          </p:cNvPicPr>
-          <p:nvPr/>
-        </p:nvPicPr>
-        <p:blipFill>
-          <a:blip r:embed="rId2">
-            <a:extLst>
-              <a:ext uri="{28A0092B-C50C-407E-A947-70E740481C1C}">
-                <a14:useLocalDpi xmlns:a14="http://schemas.microsoft.com/office/drawing/2010/main" val="0"/>
-              </a:ext>
-            </a:extLst>
-          </a:blip>
-          <a:srcRect/>
-          <a:stretch>
-            <a:fillRect/>
-          </a:stretch>
-        </p:blipFill>
-        <p:spPr bwMode="auto">
-          <a:xfrm>
-            <a:off x="2309" y="72015"/>
-            <a:ext cx="9144000" cy="6677025"/>
-          </a:xfrm>
-          <a:prstGeom prst="rect">
-            <a:avLst/>
-          </a:prstGeom>
-          <a:noFill/>
-          <a:ln>
-            <a:noFill/>
-          </a:ln>
-          <a:effectLst/>
-          <a:extLst>
-            <a:ext uri="{909E8E84-426E-40DD-AFC4-6F175D3DCCD1}">
-              <a14:hiddenFill xmlns:a14="http://schemas.microsoft.com/office/drawing/2010/main">
-                <a:solidFill>
-                  <a:schemeClr val="accent1"/>
-                </a:solidFill>
-              </a14:hiddenFill>
-            </a:ext>
-            <a:ext uri="{91240B29-F687-4F45-9708-019B960494DF}">
-              <a14:hiddenLine xmlns:a14="http://schemas.microsoft.com/office/drawing/2010/main" w="9525">
-                <a:solidFill>
-                  <a:schemeClr val="tx1"/>
-                </a:solidFill>
-                <a:miter lim="800000"/>
-                <a:headEnd/>
-                <a:tailEnd/>
-              </a14:hiddenLine>
-            </a:ext>
-            <a:ext uri="{AF507438-7753-43E0-B8FC-AC1667EBCBE1}">
-              <a14:hiddenEffects xmlns:a14="http://schemas.microsoft.com/office/drawing/2010/main">
-                <a:effectLst>
-                  <a:outerShdw dist="35921" dir="2700000" algn="ctr" rotWithShape="0">
-                    <a:schemeClr val="bg2"/>
-                  </a:outerShdw>
-                </a:effectLst>
-              </a14:hiddenEffects>
-            </a:ext>
-          </a:extLst>
-        </p:spPr>
-      </p:pic>
-    </p:spTree>
-    <p:extLst>
-      <p:ext uri="{BB962C8B-B14F-4D97-AF65-F5344CB8AC3E}">
-        <p14:creationId xmlns:p14="http://schemas.microsoft.com/office/powerpoint/2010/main" val="2555868585"/>
       </p:ext>
     </p:extLst>
   </p:cSld>
@@ -7684,11 +7886,7 @@
             </a:pPr>
             <a:r>
               <a:rPr lang="en-US" sz="1800" dirty="0" smtClean="0"/>
-              <a:t>S</a:t>
-            </a:r>
-            <a:r>
-              <a:rPr lang="en-US" sz="1800" dirty="0" smtClean="0"/>
-              <a:t>trong entity sets </a:t>
+              <a:t>Strong entity sets </a:t>
             </a:r>
             <a:r>
               <a:rPr lang="he-IL" sz="1800" dirty="0" smtClean="0"/>
@@ -8308,8 +8506,8 @@
               <a:buAutoNum type="arabicPeriod"/>
             </a:pPr>
             <a:r>
-              <a:rPr lang="en-US" sz="1800" dirty="0" err="1" smtClean="0"/>
-              <a:t>Incompletnes</a:t>
+              <a:rPr lang="en-US" sz="1800" dirty="0" smtClean="0"/>
+              <a:t>Incompleteness</a:t>
             </a:r>
             <a:endParaRPr lang="en-US" sz="1800" dirty="0" smtClean="0"/>
           </a:p>
@@ -8331,6 +8529,13 @@
   <p:clrMapOvr>
     <a:masterClrMapping/>
   </p:clrMapOvr>
+  <p:timing>
+    <p:tnLst>
+      <p:par>
+        <p:cTn id="1" dur="indefinite" restart="never" nodeType="tmRoot"/>
+      </p:par>
+    </p:tnLst>
+  </p:timing>
 </p:sld>
 </file>
 
@@ -8917,11 +9122,7 @@
             <a:pPr algn="r" rtl="1"/>
             <a:r>
               <a:rPr lang="he-IL" sz="1800" dirty="0" smtClean="0"/>
-              <a:t>נשים לב שהדיאגרמה ב 7.15 </a:t>
-            </a:r>
-            <a:r>
-              <a:rPr lang="he-IL" sz="1800" dirty="0" smtClean="0"/>
-              <a:t>היא אינה המלאה וחבל שכך</a:t>
+              <a:t>נשים לב שהדיאגרמה ב 7.15 היא אינה המלאה וחבל שכך</a:t>
             </a:r>
           </a:p>
           <a:p>
@@ -9503,10 +9704,16 @@
         </p:nvSpPr>
         <p:spPr/>
         <p:txBody>
-          <a:bodyPr/>
+          <a:bodyPr>
+            <a:normAutofit/>
+          </a:bodyPr>
           <a:lstStyle/>
           <a:p>
-            <a:endParaRPr lang="en-US"/>
+            <a:r>
+              <a:rPr lang="en-US" sz="3600" dirty="0"/>
+              <a:t>7.6.4 Representation of Relationship Sets</a:t>
+            </a:r>
+            <a:endParaRPr lang="en-US" sz="3600" dirty="0"/>
           </a:p>
         </p:txBody>
       </p:sp>
@@ -9522,13 +9729,358 @@
         </p:nvSpPr>
         <p:spPr/>
         <p:txBody>
-          <a:bodyPr/>
+          <a:bodyPr>
+            <a:normAutofit/>
+          </a:bodyPr>
           <a:lstStyle/>
           <a:p>
-            <a:endParaRPr lang="en-US"/>
-          </a:p>
-        </p:txBody>
-      </p:sp>
+            <a:endParaRPr lang="en-US" sz="2400" dirty="0" smtClean="0"/>
+          </a:p>
+          <a:p>
+            <a:endParaRPr lang="en-US" sz="2400" dirty="0"/>
+          </a:p>
+          <a:p>
+            <a:r>
+              <a:rPr lang="en-US" sz="1800" dirty="0" smtClean="0"/>
+              <a:t>This </a:t>
+            </a:r>
+            <a:r>
+              <a:rPr lang="en-US" sz="1800" dirty="0"/>
+              <a:t>relationship set involves the following two entity sets:</a:t>
+            </a:r>
+          </a:p>
+          <a:p>
+            <a:pPr marL="0" indent="0">
+              <a:buNone/>
+            </a:pPr>
+            <a:r>
+              <a:rPr lang="en-US" sz="1800" dirty="0" smtClean="0">
+                <a:solidFill>
+                  <a:srgbClr val="00B0F0"/>
+                </a:solidFill>
+              </a:rPr>
+              <a:t>•</a:t>
+            </a:r>
+            <a:r>
+              <a:rPr lang="en-US" sz="1800" dirty="0" smtClean="0"/>
+              <a:t> </a:t>
+            </a:r>
+            <a:r>
+              <a:rPr lang="en-US" sz="1800" dirty="0"/>
+              <a:t>instructor with the primary key ID.</a:t>
+            </a:r>
+          </a:p>
+          <a:p>
+            <a:pPr marL="0" indent="0">
+              <a:buNone/>
+            </a:pPr>
+            <a:r>
+              <a:rPr lang="en-US" sz="1800" dirty="0" smtClean="0">
+                <a:solidFill>
+                  <a:srgbClr val="00B0F0"/>
+                </a:solidFill>
+              </a:rPr>
+              <a:t>•</a:t>
+            </a:r>
+            <a:r>
+              <a:rPr lang="en-US" sz="1800" dirty="0" smtClean="0"/>
+              <a:t> </a:t>
+            </a:r>
+            <a:r>
+              <a:rPr lang="en-US" sz="1800" dirty="0"/>
+              <a:t>student with the primary key ID</a:t>
+            </a:r>
+            <a:r>
+              <a:rPr lang="en-US" sz="1800" dirty="0" smtClean="0"/>
+              <a:t>.</a:t>
+            </a:r>
+          </a:p>
+          <a:p>
+            <a:pPr marL="0" indent="0">
+              <a:buNone/>
+            </a:pPr>
+            <a:r>
+              <a:rPr lang="en-US" sz="1200" dirty="0"/>
+              <a:t>Since the relationship set has </a:t>
+            </a:r>
+            <a:r>
+              <a:rPr lang="en-US" sz="1200" u="sng" dirty="0"/>
+              <a:t>no attributes</a:t>
+            </a:r>
+            <a:r>
+              <a:rPr lang="en-US" sz="1200" dirty="0"/>
+              <a:t>, the </a:t>
+            </a:r>
+            <a:r>
+              <a:rPr lang="en-US" sz="1200" dirty="0">
+                <a:solidFill>
+                  <a:srgbClr val="00B0F0"/>
+                </a:solidFill>
+              </a:rPr>
+              <a:t>advisor</a:t>
+            </a:r>
+            <a:r>
+              <a:rPr lang="en-US" sz="1200" dirty="0"/>
+              <a:t> schema has two </a:t>
+            </a:r>
+            <a:r>
+              <a:rPr lang="en-US" sz="1200" dirty="0" smtClean="0"/>
+              <a:t>attributes, the </a:t>
+            </a:r>
+            <a:r>
+              <a:rPr lang="en-US" sz="1200" dirty="0"/>
+              <a:t>primary keys of instructor and student. Since both attributes have the </a:t>
+            </a:r>
+            <a:r>
+              <a:rPr lang="en-US" sz="1200" dirty="0" smtClean="0"/>
+              <a:t>same name</a:t>
+            </a:r>
+            <a:r>
+              <a:rPr lang="en-US" sz="1200" dirty="0"/>
+              <a:t>, we rename them </a:t>
+            </a:r>
+            <a:r>
+              <a:rPr lang="en-US" sz="1200" dirty="0" smtClean="0"/>
+              <a:t>i</a:t>
+            </a:r>
+            <a:r>
+              <a:rPr lang="he-IL" sz="1200" dirty="0" smtClean="0"/>
+              <a:t>_</a:t>
+            </a:r>
+            <a:r>
+              <a:rPr lang="en-US" sz="1200" dirty="0" smtClean="0"/>
+              <a:t>ID </a:t>
+            </a:r>
+            <a:r>
+              <a:rPr lang="en-US" sz="1200" dirty="0"/>
+              <a:t>and </a:t>
+            </a:r>
+            <a:r>
+              <a:rPr lang="en-US" sz="1200" dirty="0" smtClean="0"/>
+              <a:t>s</a:t>
+            </a:r>
+            <a:r>
+              <a:rPr lang="he-IL" sz="1200" dirty="0" smtClean="0"/>
+              <a:t>_</a:t>
+            </a:r>
+            <a:r>
+              <a:rPr lang="en-US" sz="1200" dirty="0" smtClean="0"/>
+              <a:t>ID.</a:t>
+            </a:r>
+          </a:p>
+          <a:p>
+            <a:pPr marL="0" indent="0" algn="r" rtl="1">
+              <a:buNone/>
+            </a:pPr>
+            <a:endParaRPr lang="en-US" sz="1200" dirty="0"/>
+          </a:p>
+          <a:p>
+            <a:pPr marL="0" indent="0" algn="r" rtl="1">
+              <a:buNone/>
+            </a:pPr>
+            <a:r>
+              <a:rPr lang="he-IL" sz="1200" dirty="0" smtClean="0"/>
+              <a:t>לפי הכלל הבא שביחס </a:t>
+            </a:r>
+            <a:r>
+              <a:rPr lang="en-US" sz="1200" dirty="0" smtClean="0"/>
+              <a:t> </a:t>
+            </a:r>
+            <a:r>
+              <a:rPr lang="he-IL" sz="1200" dirty="0" smtClean="0"/>
+              <a:t>בינארי </a:t>
+            </a:r>
+            <a:r>
+              <a:rPr lang="he-IL" sz="1200" dirty="0" smtClean="0"/>
+              <a:t>רבים לאחד ואחד לרבים ה</a:t>
+            </a:r>
+            <a:r>
+              <a:rPr lang="en-US" sz="1200" dirty="0" smtClean="0"/>
+              <a:t> primary key </a:t>
+            </a:r>
+            <a:r>
+              <a:rPr lang="he-IL" sz="1200" dirty="0" smtClean="0"/>
+              <a:t> יהיה  אותו שדה מהטבלה רבים כלומר מ</a:t>
+            </a:r>
+            <a:r>
+              <a:rPr lang="en-US" sz="1200" dirty="0" smtClean="0"/>
+              <a:t> student </a:t>
+            </a:r>
+            <a:r>
+              <a:rPr lang="he-IL" sz="1200" dirty="0" smtClean="0"/>
+              <a:t>  </a:t>
+            </a:r>
+            <a:endParaRPr lang="en-US" sz="1200" dirty="0"/>
+          </a:p>
+          <a:p>
+            <a:pPr marL="0" indent="0" algn="r" rtl="1">
+              <a:buNone/>
+            </a:pPr>
+            <a:r>
+              <a:rPr lang="en-US" sz="1200" dirty="0" err="1" smtClean="0"/>
+              <a:t>S_id</a:t>
+            </a:r>
+            <a:r>
+              <a:rPr lang="en-US" sz="1200" dirty="0" smtClean="0"/>
+              <a:t> </a:t>
+            </a:r>
+            <a:r>
+              <a:rPr lang="he-IL" sz="1200" dirty="0" smtClean="0"/>
+              <a:t> יהיה המפתח הראשי בטבלה </a:t>
+            </a:r>
+            <a:r>
+              <a:rPr lang="en-US" sz="1200" dirty="0" smtClean="0"/>
+              <a:t>advisor</a:t>
+            </a:r>
+          </a:p>
+          <a:p>
+            <a:pPr marL="0" indent="0" algn="r" rtl="1">
+              <a:buNone/>
+            </a:pPr>
+            <a:r>
+              <a:rPr lang="he-IL" sz="1200" dirty="0" smtClean="0"/>
+              <a:t>בנוסף כמובן יוצרים שני </a:t>
+            </a:r>
+            <a:r>
+              <a:rPr lang="en-US" sz="1200" dirty="0" smtClean="0"/>
+              <a:t>constraints </a:t>
+            </a:r>
+            <a:r>
+              <a:rPr lang="he-IL" sz="1200" dirty="0" smtClean="0"/>
+              <a:t>  </a:t>
+            </a:r>
+            <a:r>
+              <a:rPr lang="en-US" sz="1200" dirty="0" smtClean="0"/>
+              <a:t>   foreign keys</a:t>
+            </a:r>
+            <a:r>
+              <a:rPr lang="he-IL" sz="1200" dirty="0" smtClean="0"/>
+              <a:t> </a:t>
+            </a:r>
+            <a:r>
+              <a:rPr lang="en-US" sz="1200" dirty="0" smtClean="0"/>
+              <a:t> </a:t>
+            </a:r>
+            <a:r>
+              <a:rPr lang="he-IL" sz="1200" dirty="0" smtClean="0"/>
+              <a:t> ב </a:t>
+            </a:r>
+            <a:r>
+              <a:rPr lang="en-US" sz="1200" dirty="0" smtClean="0"/>
+              <a:t> advisor</a:t>
+            </a:r>
+            <a:r>
+              <a:rPr lang="he-IL" sz="1200" dirty="0" smtClean="0"/>
+              <a:t>  ל </a:t>
+            </a:r>
+            <a:r>
+              <a:rPr lang="en-US" sz="1200" dirty="0" smtClean="0"/>
+              <a:t>primary key  </a:t>
+            </a:r>
+            <a:r>
+              <a:rPr lang="he-IL" sz="1200" dirty="0" smtClean="0"/>
+              <a:t> ב </a:t>
+            </a:r>
+            <a:r>
+              <a:rPr lang="en-US" sz="1200" dirty="0" smtClean="0"/>
+              <a:t>student and instructor</a:t>
+            </a:r>
+          </a:p>
+          <a:p>
+            <a:pPr marL="0" indent="0" algn="r" rtl="1">
+              <a:buNone/>
+            </a:pPr>
+            <a:endParaRPr lang="en-US" sz="1200" dirty="0"/>
+          </a:p>
+          <a:p>
+            <a:pPr marL="0" indent="0" algn="ctr" rtl="1">
+              <a:buNone/>
+            </a:pPr>
+            <a:r>
+              <a:rPr lang="en-US" sz="1200" dirty="0"/>
+              <a:t>advisor (</a:t>
+            </a:r>
+            <a:r>
+              <a:rPr lang="en-US" sz="1200" u="sng" dirty="0" err="1" smtClean="0"/>
+              <a:t>s_ID</a:t>
+            </a:r>
+            <a:r>
+              <a:rPr lang="en-US" sz="1200" dirty="0"/>
+              <a:t>, i ID)</a:t>
+            </a:r>
+          </a:p>
+          <a:p>
+            <a:pPr marL="0" indent="0" algn="r" rtl="1">
+              <a:buNone/>
+            </a:pPr>
+            <a:endParaRPr lang="en-US" sz="1200" dirty="0"/>
+          </a:p>
+        </p:txBody>
+      </p:sp>
+      <p:pic>
+        <p:nvPicPr>
+          <p:cNvPr id="1026" name="Picture 2"/>
+          <p:cNvPicPr>
+            <a:picLocks noChangeAspect="1" noChangeArrowheads="1"/>
+          </p:cNvPicPr>
+          <p:nvPr/>
+        </p:nvPicPr>
+        <p:blipFill>
+          <a:blip r:embed="rId2">
+            <a:extLst>
+              <a:ext uri="{28A0092B-C50C-407E-A947-70E740481C1C}">
+                <a14:useLocalDpi xmlns:a14="http://schemas.microsoft.com/office/drawing/2010/main" val="0"/>
+              </a:ext>
+            </a:extLst>
+          </a:blip>
+          <a:srcRect/>
+          <a:stretch>
+            <a:fillRect/>
+          </a:stretch>
+        </p:blipFill>
+        <p:spPr bwMode="auto">
+          <a:xfrm>
+            <a:off x="533400" y="1676400"/>
+            <a:ext cx="4295775" cy="838200"/>
+          </a:xfrm>
+          <a:prstGeom prst="rect">
+            <a:avLst/>
+          </a:prstGeom>
+          <a:noFill/>
+          <a:ln>
+            <a:noFill/>
+          </a:ln>
+          <a:effectLst/>
+          <a:extLst>
+            <a:ext uri="{909E8E84-426E-40DD-AFC4-6F175D3DCCD1}">
+              <a14:hiddenFill xmlns:a14="http://schemas.microsoft.com/office/drawing/2010/main">
+                <a:solidFill>
+                  <a:schemeClr val="accent1"/>
+                </a:solidFill>
+              </a14:hiddenFill>
+            </a:ext>
+            <a:ext uri="{91240B29-F687-4F45-9708-019B960494DF}">
+              <a14:hiddenLine xmlns:a14="http://schemas.microsoft.com/office/drawing/2010/main" w="9525">
+                <a:solidFill>
+                  <a:schemeClr val="tx1"/>
+                </a:solidFill>
+                <a:miter lim="800000"/>
+                <a:headEnd/>
+                <a:tailEnd/>
+              </a14:hiddenLine>
+            </a:ext>
+            <a:ext uri="{AF507438-7753-43E0-B8FC-AC1667EBCBE1}">
+              <a14:hiddenEffects xmlns:a14="http://schemas.microsoft.com/office/drawing/2010/main">
+                <a:effectLst>
+                  <a:outerShdw dist="35921" dir="2700000" algn="ctr" rotWithShape="0">
+                    <a:schemeClr val="bg2"/>
+                  </a:outerShdw>
+                </a:effectLst>
+              </a14:hiddenEffects>
+            </a:ext>
+          </a:extLst>
+        </p:spPr>
+      </p:pic>
     </p:spTree>
     <p:extLst>
       <p:ext uri="{BB962C8B-B14F-4D97-AF65-F5344CB8AC3E}">
@@ -9568,57 +10120,1190 @@
       </p:grpSpPr>
       <p:sp>
         <p:nvSpPr>
-          <p:cNvPr id="2" name="Title 1"/>
-          <p:cNvSpPr>
-            <a:spLocks noGrp="1"/>
-          </p:cNvSpPr>
-          <p:nvPr>
-            <p:ph type="title"/>
-          </p:nvPr>
-        </p:nvSpPr>
-        <p:spPr/>
-        <p:txBody>
-          <a:bodyPr/>
+          <p:cNvPr id="3" name="Content Placeholder 2"/>
+          <p:cNvSpPr>
+            <a:spLocks noGrp="1"/>
+          </p:cNvSpPr>
+          <p:nvPr>
+            <p:ph idx="1"/>
+          </p:nvPr>
+        </p:nvSpPr>
+        <p:spPr>
+          <a:xfrm>
+            <a:off x="457200" y="152400"/>
+            <a:ext cx="8229600" cy="6553200"/>
+          </a:xfrm>
+        </p:spPr>
+        <p:txBody>
+          <a:bodyPr>
+            <a:normAutofit/>
+          </a:bodyPr>
           <a:lstStyle/>
           <a:p>
             <a:r>
-              <a:rPr lang="he-IL" dirty="0" smtClean="0"/>
-              <a:t>מקורות נוספים</a:t>
-            </a:r>
-            <a:endParaRPr lang="en-US" dirty="0"/>
-          </a:p>
-        </p:txBody>
-      </p:sp>
-      <p:sp>
-        <p:nvSpPr>
-          <p:cNvPr id="3" name="Content Placeholder 2"/>
-          <p:cNvSpPr>
-            <a:spLocks noGrp="1"/>
-          </p:cNvSpPr>
-          <p:nvPr>
-            <p:ph idx="1"/>
-          </p:nvPr>
-        </p:nvSpPr>
-        <p:spPr/>
-        <p:txBody>
-          <a:bodyPr/>
-          <a:lstStyle/>
-          <a:p>
-            <a:pPr algn="l"/>
-            <a:r>
-              <a:rPr lang="en-US" dirty="0" smtClean="0">
-                <a:hlinkClick r:id="rId2"/>
-              </a:rPr>
-              <a:t>Good power point presentation</a:t>
-            </a:r>
-            <a:endParaRPr lang="en-US" dirty="0"/>
-          </a:p>
-        </p:txBody>
-      </p:sp>
+              <a:rPr lang="en-US" sz="1600" dirty="0" smtClean="0"/>
+              <a:t>sec_course(</a:t>
+            </a:r>
+            <a:r>
+              <a:rPr lang="en-US" sz="1600" u="sng" dirty="0" smtClean="0"/>
+              <a:t>course_id , sec_id </a:t>
+            </a:r>
+            <a:r>
+              <a:rPr lang="en-US" sz="1600" dirty="0" smtClean="0"/>
+              <a:t>,</a:t>
+            </a:r>
+            <a:r>
+              <a:rPr lang="en-US" sz="1600" u="sng" dirty="0" smtClean="0"/>
+              <a:t>semester</a:t>
+            </a:r>
+            <a:r>
+              <a:rPr lang="en-US" sz="1600" dirty="0" smtClean="0"/>
+              <a:t>, </a:t>
+            </a:r>
+            <a:r>
+              <a:rPr lang="en-US" sz="1600" u="sng" dirty="0" smtClean="0"/>
+              <a:t>year</a:t>
+            </a:r>
+            <a:r>
+              <a:rPr lang="en-US" sz="1600" dirty="0" smtClean="0"/>
+              <a:t>)</a:t>
+            </a:r>
+          </a:p>
+          <a:p>
+            <a:r>
+              <a:rPr lang="en-US" sz="1600" dirty="0" smtClean="0"/>
+              <a:t>Section is total participation </a:t>
+            </a:r>
+          </a:p>
+          <a:p>
+            <a:pPr marL="0" indent="0">
+              <a:buNone/>
+            </a:pPr>
+            <a:endParaRPr lang="en-US" sz="1600" dirty="0" smtClean="0"/>
+          </a:p>
+          <a:p>
+            <a:endParaRPr lang="en-US" sz="1600" dirty="0"/>
+          </a:p>
+          <a:p>
+            <a:endParaRPr lang="en-US" sz="1600" dirty="0" smtClean="0"/>
+          </a:p>
+          <a:p>
+            <a:endParaRPr lang="en-US" sz="1600" dirty="0"/>
+          </a:p>
+          <a:p>
+            <a:r>
+              <a:rPr lang="en-US" sz="1600" dirty="0" smtClean="0"/>
+              <a:t>Inst_dept(</a:t>
+            </a:r>
+            <a:r>
+              <a:rPr lang="en-US" sz="1600" u="sng" dirty="0" smtClean="0"/>
+              <a:t>ID</a:t>
+            </a:r>
+            <a:r>
+              <a:rPr lang="en-US" sz="1600" dirty="0" smtClean="0"/>
+              <a:t>, dept_name)</a:t>
+            </a:r>
+          </a:p>
+          <a:p>
+            <a:r>
+              <a:rPr lang="en-US" sz="1600" dirty="0" smtClean="0"/>
+              <a:t>The two lines from instructor to inst_dept saying it is</a:t>
+            </a:r>
+          </a:p>
+          <a:p>
+            <a:pPr marL="0" indent="0">
+              <a:buNone/>
+            </a:pPr>
+            <a:r>
+              <a:rPr lang="en-US" sz="1600" dirty="0" smtClean="0"/>
+              <a:t>       Total participation, means instructor mush associate to </a:t>
+            </a:r>
+          </a:p>
+          <a:p>
+            <a:pPr marL="0" indent="0">
+              <a:buNone/>
+            </a:pPr>
+            <a:r>
+              <a:rPr lang="en-US" sz="1600" dirty="0" smtClean="0"/>
+              <a:t>       department</a:t>
+            </a:r>
+            <a:endParaRPr lang="en-US" sz="1600" dirty="0"/>
+          </a:p>
+          <a:p>
+            <a:endParaRPr lang="en-US" sz="1600" dirty="0" smtClean="0"/>
+          </a:p>
+          <a:p>
+            <a:endParaRPr lang="en-US" sz="1600" dirty="0" smtClean="0"/>
+          </a:p>
+          <a:p>
+            <a:endParaRPr lang="en-US" sz="1600" dirty="0"/>
+          </a:p>
+          <a:p>
+            <a:endParaRPr lang="en-US" sz="1600" dirty="0" smtClean="0"/>
+          </a:p>
+          <a:p>
+            <a:endParaRPr lang="en-US" sz="1600" dirty="0"/>
+          </a:p>
+          <a:p>
+            <a:endParaRPr lang="en-US" sz="1600" dirty="0" smtClean="0"/>
+          </a:p>
+          <a:p>
+            <a:r>
+              <a:rPr lang="en-US" sz="1600" dirty="0"/>
+              <a:t>takes (</a:t>
+            </a:r>
+            <a:r>
+              <a:rPr lang="en-US" sz="1600" u="sng" dirty="0"/>
+              <a:t>ID, </a:t>
+            </a:r>
+            <a:r>
+              <a:rPr lang="en-US" sz="1600" u="sng" dirty="0" smtClean="0"/>
+              <a:t>course_id</a:t>
+            </a:r>
+            <a:r>
+              <a:rPr lang="en-US" sz="1600" dirty="0"/>
+              <a:t>, </a:t>
+            </a:r>
+            <a:r>
+              <a:rPr lang="en-US" sz="1600" u="sng" dirty="0" smtClean="0"/>
+              <a:t>sec_id</a:t>
+            </a:r>
+            <a:r>
+              <a:rPr lang="en-US" sz="1600" dirty="0"/>
+              <a:t>, </a:t>
+            </a:r>
+            <a:r>
+              <a:rPr lang="en-US" sz="1600" u="sng" dirty="0"/>
+              <a:t>semester</a:t>
+            </a:r>
+            <a:r>
+              <a:rPr lang="en-US" sz="1600" dirty="0"/>
+              <a:t>, </a:t>
+            </a:r>
+            <a:r>
+              <a:rPr lang="en-US" sz="1600" u="sng" dirty="0"/>
+              <a:t>year</a:t>
+            </a:r>
+            <a:r>
+              <a:rPr lang="en-US" sz="1600" dirty="0"/>
+              <a:t>, grade</a:t>
+            </a:r>
+            <a:r>
+              <a:rPr lang="en-US" sz="1600" dirty="0" smtClean="0"/>
+              <a:t>)</a:t>
+            </a:r>
+          </a:p>
+          <a:p>
+            <a:r>
+              <a:rPr lang="en-US" sz="1600" dirty="0" smtClean="0"/>
+              <a:t>Takes has partial participation.</a:t>
+            </a:r>
+          </a:p>
+          <a:p>
+            <a:pPr marL="0" indent="0">
+              <a:buNone/>
+            </a:pPr>
+            <a:r>
+              <a:rPr lang="en-US" sz="1600" dirty="0" smtClean="0"/>
+              <a:t>       Means , a student does not must to take a course</a:t>
+            </a:r>
+            <a:endParaRPr lang="en-US" sz="1600" dirty="0"/>
+          </a:p>
+        </p:txBody>
+      </p:sp>
+      <p:pic>
+        <p:nvPicPr>
+          <p:cNvPr id="4" name="Picture 2"/>
+          <p:cNvPicPr>
+            <a:picLocks noChangeAspect="1" noChangeArrowheads="1"/>
+          </p:cNvPicPr>
+          <p:nvPr/>
+        </p:nvPicPr>
+        <p:blipFill>
+          <a:blip r:embed="rId2">
+            <a:extLst>
+              <a:ext uri="{28A0092B-C50C-407E-A947-70E740481C1C}">
+                <a14:useLocalDpi xmlns:a14="http://schemas.microsoft.com/office/drawing/2010/main" val="0"/>
+              </a:ext>
+            </a:extLst>
+          </a:blip>
+          <a:srcRect/>
+          <a:stretch>
+            <a:fillRect/>
+          </a:stretch>
+        </p:blipFill>
+        <p:spPr bwMode="auto">
+          <a:xfrm>
+            <a:off x="5486400" y="96982"/>
+            <a:ext cx="3324225" cy="781050"/>
+          </a:xfrm>
+          <a:prstGeom prst="rect">
+            <a:avLst/>
+          </a:prstGeom>
+          <a:noFill/>
+          <a:ln>
+            <a:noFill/>
+          </a:ln>
+          <a:effectLst/>
+          <a:extLst>
+            <a:ext uri="{909E8E84-426E-40DD-AFC4-6F175D3DCCD1}">
+              <a14:hiddenFill xmlns:a14="http://schemas.microsoft.com/office/drawing/2010/main">
+                <a:solidFill>
+                  <a:schemeClr val="accent1"/>
+                </a:solidFill>
+              </a14:hiddenFill>
+            </a:ext>
+            <a:ext uri="{91240B29-F687-4F45-9708-019B960494DF}">
+              <a14:hiddenLine xmlns:a14="http://schemas.microsoft.com/office/drawing/2010/main" w="9525">
+                <a:solidFill>
+                  <a:schemeClr val="tx1"/>
+                </a:solidFill>
+                <a:miter lim="800000"/>
+                <a:headEnd/>
+                <a:tailEnd/>
+              </a14:hiddenLine>
+            </a:ext>
+            <a:ext uri="{AF507438-7753-43E0-B8FC-AC1667EBCBE1}">
+              <a14:hiddenEffects xmlns:a14="http://schemas.microsoft.com/office/drawing/2010/main">
+                <a:effectLst>
+                  <a:outerShdw dist="35921" dir="2700000" algn="ctr" rotWithShape="0">
+                    <a:schemeClr val="bg2"/>
+                  </a:outerShdw>
+                </a:effectLst>
+              </a14:hiddenEffects>
+            </a:ext>
+          </a:extLst>
+        </p:spPr>
+      </p:pic>
+      <p:pic>
+        <p:nvPicPr>
+          <p:cNvPr id="2053" name="Picture 5"/>
+          <p:cNvPicPr>
+            <a:picLocks noChangeAspect="1" noChangeArrowheads="1"/>
+          </p:cNvPicPr>
+          <p:nvPr/>
+        </p:nvPicPr>
+        <p:blipFill>
+          <a:blip r:embed="rId3">
+            <a:extLst>
+              <a:ext uri="{28A0092B-C50C-407E-A947-70E740481C1C}">
+                <a14:useLocalDpi xmlns:a14="http://schemas.microsoft.com/office/drawing/2010/main" val="0"/>
+              </a:ext>
+            </a:extLst>
+          </a:blip>
+          <a:srcRect/>
+          <a:stretch>
+            <a:fillRect/>
+          </a:stretch>
+        </p:blipFill>
+        <p:spPr bwMode="auto">
+          <a:xfrm>
+            <a:off x="6000750" y="1219200"/>
+            <a:ext cx="2809875" cy="2238375"/>
+          </a:xfrm>
+          <a:prstGeom prst="rect">
+            <a:avLst/>
+          </a:prstGeom>
+          <a:noFill/>
+          <a:ln>
+            <a:noFill/>
+          </a:ln>
+          <a:effectLst/>
+          <a:extLst>
+            <a:ext uri="{909E8E84-426E-40DD-AFC4-6F175D3DCCD1}">
+              <a14:hiddenFill xmlns:a14="http://schemas.microsoft.com/office/drawing/2010/main">
+                <a:solidFill>
+                  <a:schemeClr val="accent1"/>
+                </a:solidFill>
+              </a14:hiddenFill>
+            </a:ext>
+            <a:ext uri="{91240B29-F687-4F45-9708-019B960494DF}">
+              <a14:hiddenLine xmlns:a14="http://schemas.microsoft.com/office/drawing/2010/main" w="9525">
+                <a:solidFill>
+                  <a:schemeClr val="tx1"/>
+                </a:solidFill>
+                <a:miter lim="800000"/>
+                <a:headEnd/>
+                <a:tailEnd/>
+              </a14:hiddenLine>
+            </a:ext>
+            <a:ext uri="{AF507438-7753-43E0-B8FC-AC1667EBCBE1}">
+              <a14:hiddenEffects xmlns:a14="http://schemas.microsoft.com/office/drawing/2010/main">
+                <a:effectLst>
+                  <a:outerShdw dist="35921" dir="2700000" algn="ctr" rotWithShape="0">
+                    <a:schemeClr val="bg2"/>
+                  </a:outerShdw>
+                </a:effectLst>
+              </a14:hiddenEffects>
+            </a:ext>
+          </a:extLst>
+        </p:spPr>
+      </p:pic>
+      <p:pic>
+        <p:nvPicPr>
+          <p:cNvPr id="2054" name="Picture 6"/>
+          <p:cNvPicPr>
+            <a:picLocks noChangeAspect="1" noChangeArrowheads="1"/>
+          </p:cNvPicPr>
+          <p:nvPr/>
+        </p:nvPicPr>
+        <p:blipFill>
+          <a:blip r:embed="rId4">
+            <a:extLst>
+              <a:ext uri="{28A0092B-C50C-407E-A947-70E740481C1C}">
+                <a14:useLocalDpi xmlns:a14="http://schemas.microsoft.com/office/drawing/2010/main" val="0"/>
+              </a:ext>
+            </a:extLst>
+          </a:blip>
+          <a:srcRect/>
+          <a:stretch>
+            <a:fillRect/>
+          </a:stretch>
+        </p:blipFill>
+        <p:spPr bwMode="auto">
+          <a:xfrm>
+            <a:off x="5243080" y="3590636"/>
+            <a:ext cx="3581400" cy="2952750"/>
+          </a:xfrm>
+          <a:prstGeom prst="rect">
+            <a:avLst/>
+          </a:prstGeom>
+          <a:noFill/>
+          <a:ln>
+            <a:noFill/>
+          </a:ln>
+          <a:effectLst/>
+          <a:extLst>
+            <a:ext uri="{909E8E84-426E-40DD-AFC4-6F175D3DCCD1}">
+              <a14:hiddenFill xmlns:a14="http://schemas.microsoft.com/office/drawing/2010/main">
+                <a:solidFill>
+                  <a:schemeClr val="accent1"/>
+                </a:solidFill>
+              </a14:hiddenFill>
+            </a:ext>
+            <a:ext uri="{91240B29-F687-4F45-9708-019B960494DF}">
+              <a14:hiddenLine xmlns:a14="http://schemas.microsoft.com/office/drawing/2010/main" w="9525">
+                <a:solidFill>
+                  <a:schemeClr val="tx1"/>
+                </a:solidFill>
+                <a:miter lim="800000"/>
+                <a:headEnd/>
+                <a:tailEnd/>
+              </a14:hiddenLine>
+            </a:ext>
+            <a:ext uri="{AF507438-7753-43E0-B8FC-AC1667EBCBE1}">
+              <a14:hiddenEffects xmlns:a14="http://schemas.microsoft.com/office/drawing/2010/main">
+                <a:effectLst>
+                  <a:outerShdw dist="35921" dir="2700000" algn="ctr" rotWithShape="0">
+                    <a:schemeClr val="bg2"/>
+                  </a:outerShdw>
+                </a:effectLst>
+              </a14:hiddenEffects>
+            </a:ext>
+          </a:extLst>
+        </p:spPr>
+      </p:pic>
     </p:spTree>
     <p:extLst>
       <p:ext uri="{BB962C8B-B14F-4D97-AF65-F5344CB8AC3E}">
-        <p14:creationId xmlns:p14="http://schemas.microsoft.com/office/powerpoint/2010/main" val="3498318727"/>
+        <p14:creationId xmlns:p14="http://schemas.microsoft.com/office/powerpoint/2010/main" val="1479587548"/>
+      </p:ext>
+    </p:extLst>
+  </p:cSld>
+  <p:clrMapOvr>
+    <a:masterClrMapping/>
+  </p:clrMapOvr>
+  <p:timing>
+    <p:tnLst>
+      <p:par>
+        <p:cTn id="1" dur="indefinite" restart="never" nodeType="tmRoot"/>
+      </p:par>
+    </p:tnLst>
+  </p:timing>
+</p:sld>
+</file>
+
+<file path=ppt/slides/slide37.xml><?xml version="1.0" encoding="utf-8"?>
+<p:sld xmlns:a="http://schemas.openxmlformats.org/drawingml/2006/main" xmlns:r="http://schemas.openxmlformats.org/officeDocument/2006/relationships" xmlns:p="http://schemas.openxmlformats.org/presentationml/2006/main">
+  <p:cSld>
+    <p:spTree>
+      <p:nvGrpSpPr>
+        <p:cNvPr id="1" name=""/>
+        <p:cNvGrpSpPr/>
+        <p:nvPr/>
+      </p:nvGrpSpPr>
+      <p:grpSpPr>
+        <a:xfrm>
+          <a:off x="0" y="0"/>
+          <a:ext cx="0" cy="0"/>
+          <a:chOff x="0" y="0"/>
+          <a:chExt cx="0" cy="0"/>
+        </a:xfrm>
+      </p:grpSpPr>
+      <p:sp>
+        <p:nvSpPr>
+          <p:cNvPr id="3" name="Content Placeholder 2"/>
+          <p:cNvSpPr>
+            <a:spLocks noGrp="1"/>
+          </p:cNvSpPr>
+          <p:nvPr>
+            <p:ph idx="1"/>
+          </p:nvPr>
+        </p:nvSpPr>
+        <p:spPr>
+          <a:xfrm>
+            <a:off x="457200" y="228600"/>
+            <a:ext cx="8229600" cy="6553200"/>
+          </a:xfrm>
+        </p:spPr>
+        <p:txBody>
+          <a:bodyPr>
+            <a:normAutofit/>
+          </a:bodyPr>
+          <a:lstStyle/>
+          <a:p>
+            <a:endParaRPr lang="en-US" sz="1600" dirty="0" smtClean="0"/>
+          </a:p>
+          <a:p>
+            <a:endParaRPr lang="en-US" sz="1600" dirty="0"/>
+          </a:p>
+          <a:p>
+            <a:endParaRPr lang="en-US" sz="1600" dirty="0" smtClean="0"/>
+          </a:p>
+          <a:p>
+            <a:endParaRPr lang="en-US" sz="1600" dirty="0"/>
+          </a:p>
+          <a:p>
+            <a:r>
+              <a:rPr lang="en-US" sz="1600" dirty="0" smtClean="0"/>
+              <a:t>set_time_slot(</a:t>
+            </a:r>
+            <a:r>
+              <a:rPr lang="en-US" sz="1600" u="sng" dirty="0" smtClean="0"/>
+              <a:t>course_id</a:t>
+            </a:r>
+            <a:r>
+              <a:rPr lang="en-US" sz="1600" dirty="0" smtClean="0"/>
+              <a:t>, </a:t>
+            </a:r>
+            <a:r>
+              <a:rPr lang="en-US" sz="1600" u="sng" dirty="0" smtClean="0"/>
+              <a:t>sec_id , semester , year </a:t>
+            </a:r>
+            <a:r>
+              <a:rPr lang="en-US" sz="1600" dirty="0" smtClean="0"/>
+              <a:t>, time_slot_id)</a:t>
+            </a:r>
+          </a:p>
+          <a:p>
+            <a:r>
+              <a:rPr lang="en-US" sz="1600" dirty="0" smtClean="0"/>
+              <a:t>Section is weak entity and the primary is from the many</a:t>
+            </a:r>
+          </a:p>
+          <a:p>
+            <a:pPr marL="0" indent="0">
+              <a:buNone/>
+            </a:pPr>
+            <a:r>
+              <a:rPr lang="en-US" sz="1600" dirty="0" smtClean="0"/>
+              <a:t>       Means from section.</a:t>
+            </a:r>
+          </a:p>
+          <a:p>
+            <a:pPr marL="0" indent="0">
+              <a:buNone/>
+            </a:pPr>
+            <a:endParaRPr lang="en-US" sz="1600" dirty="0"/>
+          </a:p>
+          <a:p>
+            <a:pPr marL="0" indent="0">
+              <a:buNone/>
+            </a:pPr>
+            <a:r>
+              <a:rPr lang="en-US" sz="1600" dirty="0" smtClean="0"/>
+              <a:t>	        </a:t>
+            </a:r>
+            <a:r>
+              <a:rPr lang="en-US" sz="1600" u="sng" dirty="0" smtClean="0"/>
+              <a:t>sec_class(course_id, sec_id, semester, year</a:t>
+            </a:r>
+            <a:r>
+              <a:rPr lang="en-US" sz="1600" dirty="0" smtClean="0"/>
+              <a:t>,  building, room_number)</a:t>
+            </a:r>
+          </a:p>
+          <a:p>
+            <a:pPr marL="0" indent="0">
+              <a:buNone/>
+            </a:pPr>
+            <a:r>
+              <a:rPr lang="en-US" sz="1600" dirty="0" smtClean="0"/>
+              <a:t>                            section is total participate in set_class</a:t>
+            </a:r>
+          </a:p>
+          <a:p>
+            <a:pPr marL="0" indent="0">
+              <a:buNone/>
+            </a:pPr>
+            <a:r>
+              <a:rPr lang="en-US" sz="1600" dirty="0"/>
+              <a:t>	</a:t>
+            </a:r>
+            <a:r>
+              <a:rPr lang="en-US" sz="1600" dirty="0" smtClean="0"/>
+              <a:t>        you cannot put many sections in one room, a room can hold many section</a:t>
+            </a:r>
+          </a:p>
+          <a:p>
+            <a:pPr marL="0" indent="0">
+              <a:buNone/>
+            </a:pPr>
+            <a:endParaRPr lang="en-US" sz="1600" dirty="0"/>
+          </a:p>
+          <a:p>
+            <a:pPr marL="0" indent="0">
+              <a:buNone/>
+            </a:pPr>
+            <a:endParaRPr lang="en-US" sz="1600" dirty="0" smtClean="0"/>
+          </a:p>
+          <a:p>
+            <a:pPr marL="0" indent="0">
+              <a:buNone/>
+            </a:pPr>
+            <a:endParaRPr lang="en-US" sz="1600" dirty="0"/>
+          </a:p>
+          <a:p>
+            <a:pPr marL="0" indent="0">
+              <a:buNone/>
+            </a:pPr>
+            <a:endParaRPr lang="en-US" sz="1600" dirty="0" smtClean="0"/>
+          </a:p>
+          <a:p>
+            <a:pPr marL="0" indent="0">
+              <a:buNone/>
+            </a:pPr>
+            <a:endParaRPr lang="en-US" sz="1600" dirty="0"/>
+          </a:p>
+          <a:p>
+            <a:pPr marL="0" indent="0">
+              <a:buNone/>
+            </a:pPr>
+            <a:endParaRPr lang="en-US" sz="1600" dirty="0" smtClean="0"/>
+          </a:p>
+          <a:p>
+            <a:pPr marL="0" indent="0">
+              <a:buNone/>
+            </a:pPr>
+            <a:r>
+              <a:rPr lang="en-US" sz="1600" dirty="0"/>
+              <a:t>	</a:t>
+            </a:r>
+            <a:r>
+              <a:rPr lang="en-US" sz="1600" dirty="0" smtClean="0"/>
+              <a:t>                      t        </a:t>
+            </a:r>
+            <a:r>
+              <a:rPr lang="en-US" sz="1600" dirty="0" err="1" smtClean="0"/>
+              <a:t>t</a:t>
+            </a:r>
+            <a:r>
+              <a:rPr lang="en-US" sz="1600" dirty="0" smtClean="0"/>
+              <a:t>           teaches, </a:t>
+            </a:r>
+            <a:r>
+              <a:rPr lang="en-US" sz="1600" u="sng" dirty="0" smtClean="0"/>
+              <a:t>course_id, sec_id, semester, year</a:t>
+            </a:r>
+            <a:r>
+              <a:rPr lang="en-US" sz="1600" dirty="0" smtClean="0"/>
+              <a:t>)</a:t>
+            </a:r>
+            <a:endParaRPr lang="en-US" sz="1600" dirty="0"/>
+          </a:p>
+          <a:p>
+            <a:pPr marL="0" indent="0">
+              <a:buNone/>
+            </a:pPr>
+            <a:r>
+              <a:rPr lang="en-US" sz="1600" dirty="0" smtClean="0"/>
+              <a:t>			    in many to many all the attributes are primary key</a:t>
+            </a:r>
+            <a:endParaRPr lang="en-US" sz="1600" dirty="0"/>
+          </a:p>
+        </p:txBody>
+      </p:sp>
+      <p:pic>
+        <p:nvPicPr>
+          <p:cNvPr id="4098" name="Picture 2"/>
+          <p:cNvPicPr>
+            <a:picLocks noChangeAspect="1" noChangeArrowheads="1"/>
+          </p:cNvPicPr>
+          <p:nvPr/>
+        </p:nvPicPr>
+        <p:blipFill>
+          <a:blip r:embed="rId2">
+            <a:extLst>
+              <a:ext uri="{28A0092B-C50C-407E-A947-70E740481C1C}">
+                <a14:useLocalDpi xmlns:a14="http://schemas.microsoft.com/office/drawing/2010/main" val="0"/>
+              </a:ext>
+            </a:extLst>
+          </a:blip>
+          <a:srcRect/>
+          <a:stretch>
+            <a:fillRect/>
+          </a:stretch>
+        </p:blipFill>
+        <p:spPr bwMode="auto">
+          <a:xfrm>
+            <a:off x="1066800" y="228600"/>
+            <a:ext cx="3181350" cy="1171575"/>
+          </a:xfrm>
+          <a:prstGeom prst="rect">
+            <a:avLst/>
+          </a:prstGeom>
+          <a:noFill/>
+          <a:ln>
+            <a:noFill/>
+          </a:ln>
+          <a:effectLst/>
+          <a:extLst>
+            <a:ext uri="{909E8E84-426E-40DD-AFC4-6F175D3DCCD1}">
+              <a14:hiddenFill xmlns:a14="http://schemas.microsoft.com/office/drawing/2010/main">
+                <a:solidFill>
+                  <a:schemeClr val="accent1"/>
+                </a:solidFill>
+              </a14:hiddenFill>
+            </a:ext>
+            <a:ext uri="{91240B29-F687-4F45-9708-019B960494DF}">
+              <a14:hiddenLine xmlns:a14="http://schemas.microsoft.com/office/drawing/2010/main" w="9525">
+                <a:solidFill>
+                  <a:schemeClr val="tx1"/>
+                </a:solidFill>
+                <a:miter lim="800000"/>
+                <a:headEnd/>
+                <a:tailEnd/>
+              </a14:hiddenLine>
+            </a:ext>
+            <a:ext uri="{AF507438-7753-43E0-B8FC-AC1667EBCBE1}">
+              <a14:hiddenEffects xmlns:a14="http://schemas.microsoft.com/office/drawing/2010/main">
+                <a:effectLst>
+                  <a:outerShdw dist="35921" dir="2700000" algn="ctr" rotWithShape="0">
+                    <a:schemeClr val="bg2"/>
+                  </a:outerShdw>
+                </a:effectLst>
+              </a14:hiddenEffects>
+            </a:ext>
+          </a:extLst>
+        </p:spPr>
+      </p:pic>
+      <p:pic>
+        <p:nvPicPr>
+          <p:cNvPr id="4100" name="Picture 4"/>
+          <p:cNvPicPr>
+            <a:picLocks noChangeAspect="1" noChangeArrowheads="1"/>
+          </p:cNvPicPr>
+          <p:nvPr/>
+        </p:nvPicPr>
+        <p:blipFill>
+          <a:blip r:embed="rId3">
+            <a:extLst>
+              <a:ext uri="{28A0092B-C50C-407E-A947-70E740481C1C}">
+                <a14:useLocalDpi xmlns:a14="http://schemas.microsoft.com/office/drawing/2010/main" val="0"/>
+              </a:ext>
+            </a:extLst>
+          </a:blip>
+          <a:srcRect/>
+          <a:stretch>
+            <a:fillRect/>
+          </a:stretch>
+        </p:blipFill>
+        <p:spPr bwMode="auto">
+          <a:xfrm>
+            <a:off x="685800" y="2360324"/>
+            <a:ext cx="1057275" cy="2314575"/>
+          </a:xfrm>
+          <a:prstGeom prst="rect">
+            <a:avLst/>
+          </a:prstGeom>
+          <a:noFill/>
+          <a:ln>
+            <a:noFill/>
+          </a:ln>
+          <a:effectLst/>
+          <a:extLst>
+            <a:ext uri="{909E8E84-426E-40DD-AFC4-6F175D3DCCD1}">
+              <a14:hiddenFill xmlns:a14="http://schemas.microsoft.com/office/drawing/2010/main">
+                <a:solidFill>
+                  <a:schemeClr val="accent1"/>
+                </a:solidFill>
+              </a14:hiddenFill>
+            </a:ext>
+            <a:ext uri="{91240B29-F687-4F45-9708-019B960494DF}">
+              <a14:hiddenLine xmlns:a14="http://schemas.microsoft.com/office/drawing/2010/main" w="9525">
+                <a:solidFill>
+                  <a:schemeClr val="tx1"/>
+                </a:solidFill>
+                <a:miter lim="800000"/>
+                <a:headEnd/>
+                <a:tailEnd/>
+              </a14:hiddenLine>
+            </a:ext>
+            <a:ext uri="{AF507438-7753-43E0-B8FC-AC1667EBCBE1}">
+              <a14:hiddenEffects xmlns:a14="http://schemas.microsoft.com/office/drawing/2010/main">
+                <a:effectLst>
+                  <a:outerShdw dist="35921" dir="2700000" algn="ctr" rotWithShape="0">
+                    <a:schemeClr val="bg2"/>
+                  </a:outerShdw>
+                </a:effectLst>
+              </a14:hiddenEffects>
+            </a:ext>
+          </a:extLst>
+        </p:spPr>
+      </p:pic>
+      <p:pic>
+        <p:nvPicPr>
+          <p:cNvPr id="4101" name="Picture 5"/>
+          <p:cNvPicPr>
+            <a:picLocks noChangeAspect="1" noChangeArrowheads="1"/>
+          </p:cNvPicPr>
+          <p:nvPr/>
+        </p:nvPicPr>
+        <p:blipFill>
+          <a:blip r:embed="rId4">
+            <a:extLst>
+              <a:ext uri="{28A0092B-C50C-407E-A947-70E740481C1C}">
+                <a14:useLocalDpi xmlns:a14="http://schemas.microsoft.com/office/drawing/2010/main" val="0"/>
+              </a:ext>
+            </a:extLst>
+          </a:blip>
+          <a:srcRect/>
+          <a:stretch>
+            <a:fillRect/>
+          </a:stretch>
+        </p:blipFill>
+        <p:spPr bwMode="auto">
+          <a:xfrm>
+            <a:off x="731405" y="4656426"/>
+            <a:ext cx="2533650" cy="2125374"/>
+          </a:xfrm>
+          <a:prstGeom prst="rect">
+            <a:avLst/>
+          </a:prstGeom>
+          <a:noFill/>
+          <a:ln>
+            <a:noFill/>
+          </a:ln>
+          <a:effectLst/>
+          <a:extLst>
+            <a:ext uri="{909E8E84-426E-40DD-AFC4-6F175D3DCCD1}">
+              <a14:hiddenFill xmlns:a14="http://schemas.microsoft.com/office/drawing/2010/main">
+                <a:solidFill>
+                  <a:schemeClr val="accent1"/>
+                </a:solidFill>
+              </a14:hiddenFill>
+            </a:ext>
+            <a:ext uri="{91240B29-F687-4F45-9708-019B960494DF}">
+              <a14:hiddenLine xmlns:a14="http://schemas.microsoft.com/office/drawing/2010/main" w="9525">
+                <a:solidFill>
+                  <a:schemeClr val="tx1"/>
+                </a:solidFill>
+                <a:miter lim="800000"/>
+                <a:headEnd/>
+                <a:tailEnd/>
+              </a14:hiddenLine>
+            </a:ext>
+            <a:ext uri="{AF507438-7753-43E0-B8FC-AC1667EBCBE1}">
+              <a14:hiddenEffects xmlns:a14="http://schemas.microsoft.com/office/drawing/2010/main">
+                <a:effectLst>
+                  <a:outerShdw dist="35921" dir="2700000" algn="ctr" rotWithShape="0">
+                    <a:schemeClr val="bg2"/>
+                  </a:outerShdw>
+                </a:effectLst>
+              </a14:hiddenEffects>
+            </a:ext>
+          </a:extLst>
+        </p:spPr>
+      </p:pic>
+    </p:spTree>
+    <p:extLst>
+      <p:ext uri="{BB962C8B-B14F-4D97-AF65-F5344CB8AC3E}">
+        <p14:creationId xmlns:p14="http://schemas.microsoft.com/office/powerpoint/2010/main" val="1282018036"/>
+      </p:ext>
+    </p:extLst>
+  </p:cSld>
+  <p:clrMapOvr>
+    <a:masterClrMapping/>
+  </p:clrMapOvr>
+  <p:timing>
+    <p:tnLst>
+      <p:par>
+        <p:cTn id="1" dur="indefinite" restart="never" nodeType="tmRoot"/>
+      </p:par>
+    </p:tnLst>
+  </p:timing>
+</p:sld>
+</file>
+
+<file path=ppt/slides/slide38.xml><?xml version="1.0" encoding="utf-8"?>
+<p:sld xmlns:a="http://schemas.openxmlformats.org/drawingml/2006/main" xmlns:r="http://schemas.openxmlformats.org/officeDocument/2006/relationships" xmlns:p="http://schemas.openxmlformats.org/presentationml/2006/main">
+  <p:cSld>
+    <p:spTree>
+      <p:nvGrpSpPr>
+        <p:cNvPr id="1" name=""/>
+        <p:cNvGrpSpPr/>
+        <p:nvPr/>
+      </p:nvGrpSpPr>
+      <p:grpSpPr>
+        <a:xfrm>
+          <a:off x="0" y="0"/>
+          <a:ext cx="0" cy="0"/>
+          <a:chOff x="0" y="0"/>
+          <a:chExt cx="0" cy="0"/>
+        </a:xfrm>
+      </p:grpSpPr>
+      <p:sp>
+        <p:nvSpPr>
+          <p:cNvPr id="2" name="Title 1"/>
+          <p:cNvSpPr>
+            <a:spLocks noGrp="1"/>
+          </p:cNvSpPr>
+          <p:nvPr>
+            <p:ph type="title"/>
+          </p:nvPr>
+        </p:nvSpPr>
+        <p:spPr/>
+        <p:txBody>
+          <a:bodyPr/>
+          <a:lstStyle/>
+          <a:p>
+            <a:r>
+              <a:rPr lang="en-US" dirty="0"/>
+              <a:t>7.6.4.1 Redundancy of Schemas</a:t>
+            </a:r>
+          </a:p>
+        </p:txBody>
+      </p:sp>
+      <p:sp>
+        <p:nvSpPr>
+          <p:cNvPr id="3" name="Content Placeholder 2"/>
+          <p:cNvSpPr>
+            <a:spLocks noGrp="1"/>
+          </p:cNvSpPr>
+          <p:nvPr>
+            <p:ph idx="1"/>
+          </p:nvPr>
+        </p:nvSpPr>
+        <p:spPr/>
+        <p:txBody>
+          <a:bodyPr>
+            <a:normAutofit/>
+          </a:bodyPr>
+          <a:lstStyle/>
+          <a:p>
+            <a:pPr algn="r" rtl="1"/>
+            <a:r>
+              <a:rPr lang="he-IL" sz="1800" dirty="0" smtClean="0"/>
+              <a:t>המסקנה כאן היא:</a:t>
+            </a:r>
+          </a:p>
+          <a:p>
+            <a:pPr algn="l"/>
+            <a:r>
+              <a:rPr lang="he-IL" sz="1800" dirty="0" smtClean="0"/>
+              <a:t> </a:t>
+            </a:r>
+            <a:r>
+              <a:rPr lang="en-US" sz="1800" dirty="0"/>
+              <a:t>the schema for the relationship set linking a weak entity set to </a:t>
+            </a:r>
+            <a:r>
+              <a:rPr lang="en-US" sz="1800" dirty="0" smtClean="0"/>
+              <a:t>its</a:t>
+            </a:r>
+            <a:endParaRPr lang="en-US" sz="1800" dirty="0"/>
+          </a:p>
+          <a:p>
+            <a:pPr marL="0" indent="0" algn="l">
+              <a:buNone/>
+            </a:pPr>
+            <a:r>
+              <a:rPr lang="he-IL" sz="1800" dirty="0" smtClean="0"/>
+              <a:t>      </a:t>
+            </a:r>
+            <a:r>
+              <a:rPr lang="en-US" sz="1800" dirty="0" smtClean="0"/>
+              <a:t>corresponding </a:t>
+            </a:r>
+            <a:r>
+              <a:rPr lang="en-US" sz="1800" dirty="0"/>
+              <a:t>strong entity set is redundant and does not need to be present in</a:t>
+            </a:r>
+          </a:p>
+          <a:p>
+            <a:pPr marL="0" indent="0" algn="l">
+              <a:buNone/>
+            </a:pPr>
+            <a:r>
+              <a:rPr lang="he-IL" sz="1800" dirty="0" smtClean="0"/>
+              <a:t>      </a:t>
+            </a:r>
+            <a:r>
+              <a:rPr lang="en-US" sz="1800" dirty="0" smtClean="0"/>
+              <a:t>a </a:t>
+            </a:r>
+            <a:r>
+              <a:rPr lang="en-US" sz="1800" dirty="0"/>
+              <a:t>relational database design based upon an E-R diagram</a:t>
+            </a:r>
+            <a:r>
+              <a:rPr lang="en-US" sz="1800" dirty="0" smtClean="0"/>
+              <a:t>.</a:t>
+            </a:r>
+            <a:endParaRPr lang="he-IL" sz="1800" dirty="0" smtClean="0"/>
+          </a:p>
+          <a:p>
+            <a:pPr marL="0" indent="0" algn="l">
+              <a:buNone/>
+            </a:pPr>
+            <a:endParaRPr lang="he-IL" sz="1800" dirty="0" smtClean="0"/>
+          </a:p>
+          <a:p>
+            <a:pPr marL="0" indent="0">
+              <a:buNone/>
+            </a:pPr>
+            <a:r>
+              <a:rPr lang="en-US" sz="1800" dirty="0" smtClean="0"/>
+              <a:t>      Thus</a:t>
+            </a:r>
+            <a:r>
+              <a:rPr lang="en-US" sz="1800" dirty="0"/>
+              <a:t>, the </a:t>
+            </a:r>
+            <a:r>
+              <a:rPr lang="en-US" sz="1800" dirty="0" smtClean="0">
+                <a:solidFill>
+                  <a:srgbClr val="FF0000"/>
+                </a:solidFill>
+              </a:rPr>
+              <a:t>sec_course</a:t>
+            </a:r>
+            <a:r>
+              <a:rPr lang="en-US" sz="1800" dirty="0" smtClean="0"/>
+              <a:t> </a:t>
+            </a:r>
+            <a:r>
+              <a:rPr lang="en-US" sz="1800" dirty="0"/>
+              <a:t>schema is redundant</a:t>
+            </a:r>
+            <a:r>
+              <a:rPr lang="en-US" sz="1800" dirty="0" smtClean="0"/>
+              <a:t>.</a:t>
+            </a:r>
+          </a:p>
+          <a:p>
+            <a:pPr marL="0" indent="0" algn="r" rtl="1">
+              <a:buNone/>
+            </a:pPr>
+            <a:r>
+              <a:rPr lang="he-IL" sz="1800" dirty="0" smtClean="0"/>
+              <a:t>אין לו </a:t>
+            </a:r>
+            <a:r>
+              <a:rPr lang="en-US" sz="1800" dirty="0" smtClean="0"/>
+              <a:t>attribute </a:t>
+            </a:r>
+            <a:r>
+              <a:rPr lang="he-IL" sz="1800" dirty="0" smtClean="0"/>
+              <a:t> נוסף והמידע בו קיים ב שתי הטבלאות שהוא מקושר אליהן.</a:t>
+            </a:r>
+            <a:endParaRPr lang="he-IL" sz="1800" dirty="0"/>
+          </a:p>
+          <a:p>
+            <a:pPr marL="0" indent="0" algn="r" rtl="1">
+              <a:buNone/>
+            </a:pPr>
+            <a:endParaRPr lang="en-US" sz="1800" dirty="0"/>
+          </a:p>
+        </p:txBody>
+      </p:sp>
+    </p:spTree>
+    <p:extLst>
+      <p:ext uri="{BB962C8B-B14F-4D97-AF65-F5344CB8AC3E}">
+        <p14:creationId xmlns:p14="http://schemas.microsoft.com/office/powerpoint/2010/main" val="1225497074"/>
+      </p:ext>
+    </p:extLst>
+  </p:cSld>
+  <p:clrMapOvr>
+    <a:masterClrMapping/>
+  </p:clrMapOvr>
+  <p:timing>
+    <p:tnLst>
+      <p:par>
+        <p:cTn id="1" dur="indefinite" restart="never" nodeType="tmRoot"/>
+      </p:par>
+    </p:tnLst>
+  </p:timing>
+</p:sld>
+</file>
+
+<file path=ppt/slides/slide39.xml><?xml version="1.0" encoding="utf-8"?>
+<p:sld xmlns:a="http://schemas.openxmlformats.org/drawingml/2006/main" xmlns:r="http://schemas.openxmlformats.org/officeDocument/2006/relationships" xmlns:p="http://schemas.openxmlformats.org/presentationml/2006/main">
+  <p:cSld>
+    <p:spTree>
+      <p:nvGrpSpPr>
+        <p:cNvPr id="1" name=""/>
+        <p:cNvGrpSpPr/>
+        <p:nvPr/>
+      </p:nvGrpSpPr>
+      <p:grpSpPr>
+        <a:xfrm>
+          <a:off x="0" y="0"/>
+          <a:ext cx="0" cy="0"/>
+          <a:chOff x="0" y="0"/>
+          <a:chExt cx="0" cy="0"/>
+        </a:xfrm>
+      </p:grpSpPr>
+      <p:sp>
+        <p:nvSpPr>
+          <p:cNvPr id="2" name="Title 1"/>
+          <p:cNvSpPr>
+            <a:spLocks noGrp="1"/>
+          </p:cNvSpPr>
+          <p:nvPr>
+            <p:ph type="title"/>
+          </p:nvPr>
+        </p:nvSpPr>
+        <p:spPr/>
+        <p:txBody>
+          <a:bodyPr/>
+          <a:lstStyle/>
+          <a:p>
+            <a:r>
+              <a:rPr lang="en-US" dirty="0"/>
+              <a:t>Combination of Schemas</a:t>
+            </a:r>
+          </a:p>
+        </p:txBody>
+      </p:sp>
+      <p:sp>
+        <p:nvSpPr>
+          <p:cNvPr id="3" name="Content Placeholder 2"/>
+          <p:cNvSpPr>
+            <a:spLocks noGrp="1"/>
+          </p:cNvSpPr>
+          <p:nvPr>
+            <p:ph idx="1"/>
+          </p:nvPr>
+        </p:nvSpPr>
+        <p:spPr/>
+        <p:txBody>
+          <a:bodyPr>
+            <a:normAutofit/>
+          </a:bodyPr>
+          <a:lstStyle/>
+          <a:p>
+            <a:pPr algn="r" rtl="1"/>
+            <a:r>
+              <a:rPr lang="he-IL" sz="1800" dirty="0" smtClean="0"/>
+              <a:t>כאשר יש יחס אחד לרבים ה </a:t>
+            </a:r>
+            <a:r>
+              <a:rPr lang="en-US" sz="1800" dirty="0" smtClean="0"/>
+              <a:t>relationship set </a:t>
+            </a:r>
+            <a:r>
+              <a:rPr lang="he-IL" sz="1800" dirty="0" smtClean="0"/>
+              <a:t> היא מיותרת וניתן לאחד אותה וכך להמנע מהגדרתה.</a:t>
+            </a:r>
+          </a:p>
+          <a:p>
+            <a:pPr algn="r" rtl="1"/>
+            <a:r>
+              <a:rPr lang="he-IL" sz="1800" dirty="0" smtClean="0"/>
+              <a:t>היחס בין </a:t>
+            </a:r>
+            <a:r>
+              <a:rPr lang="en-US" sz="1800" dirty="0" smtClean="0"/>
+              <a:t>instructors </a:t>
+            </a:r>
+            <a:r>
+              <a:rPr lang="he-IL" sz="1800" dirty="0" smtClean="0"/>
+              <a:t> לבין </a:t>
+            </a:r>
+            <a:r>
+              <a:rPr lang="en-US" sz="1800" dirty="0" smtClean="0"/>
+              <a:t>department </a:t>
+            </a:r>
+            <a:r>
+              <a:rPr lang="he-IL" sz="1800" dirty="0" smtClean="0"/>
+              <a:t> הוא כזה שיכולים להיות כמה מרצים שונים באותו מקצוע.</a:t>
+            </a:r>
+          </a:p>
+          <a:p>
+            <a:pPr algn="r" rtl="1"/>
+            <a:r>
+              <a:rPr lang="he-IL" sz="1800" dirty="0" smtClean="0"/>
+              <a:t>לדוגמא: </a:t>
+            </a:r>
+            <a:r>
+              <a:rPr lang="en-US" sz="1800" dirty="0" smtClean="0"/>
+              <a:t>inst_dept.</a:t>
+            </a:r>
+            <a:r>
+              <a:rPr lang="he-IL" sz="1800" dirty="0" smtClean="0"/>
+              <a:t> אם נרחיב את </a:t>
+            </a:r>
+            <a:r>
+              <a:rPr lang="en-US" sz="1800" dirty="0" smtClean="0"/>
+              <a:t>instructor </a:t>
+            </a:r>
+            <a:r>
+              <a:rPr lang="he-IL" sz="1800" dirty="0" smtClean="0"/>
+              <a:t> שיכיל את המחלקה שהוא שייך אליה </a:t>
+            </a:r>
+          </a:p>
+          <a:p>
+            <a:pPr marL="0" indent="0" algn="r" rtl="1">
+              <a:buNone/>
+            </a:pPr>
+            <a:r>
+              <a:rPr lang="he-IL" sz="1800" dirty="0" smtClean="0"/>
+              <a:t>     נוכל לוותר על על ההגדרה של </a:t>
+            </a:r>
+            <a:r>
+              <a:rPr lang="en-US" sz="1800" dirty="0" smtClean="0"/>
+              <a:t>inst_dept</a:t>
+            </a:r>
+            <a:endParaRPr lang="he-IL" sz="1800" dirty="0" smtClean="0"/>
+          </a:p>
+          <a:p>
+            <a:pPr marL="0" indent="0" algn="r" rtl="1">
+              <a:buNone/>
+            </a:pPr>
+            <a:endParaRPr lang="he-IL" sz="1800" dirty="0"/>
+          </a:p>
+          <a:p>
+            <a:pPr marL="0" indent="0" algn="r" rtl="1">
+              <a:buNone/>
+            </a:pPr>
+            <a:endParaRPr lang="he-IL" sz="1800" dirty="0" smtClean="0"/>
+          </a:p>
+          <a:p>
+            <a:pPr marL="0" indent="0" algn="r" rtl="1">
+              <a:buNone/>
+            </a:pPr>
+            <a:r>
+              <a:rPr lang="he-IL" sz="1800" dirty="0" smtClean="0"/>
+              <a:t>לא סגור על זה!!!!</a:t>
+            </a:r>
+          </a:p>
+        </p:txBody>
+      </p:sp>
+    </p:spTree>
+    <p:extLst>
+      <p:ext uri="{BB962C8B-B14F-4D97-AF65-F5344CB8AC3E}">
+        <p14:creationId xmlns:p14="http://schemas.microsoft.com/office/powerpoint/2010/main" val="1032748437"/>
       </p:ext>
     </p:extLst>
   </p:cSld>
@@ -9703,7 +11388,23 @@
             </a:pPr>
             <a:r>
               <a:rPr lang="en-US" sz="1800" dirty="0" smtClean="0"/>
-              <a:t> entity sets, relationship sets, and attributes,</a:t>
+              <a:t> </a:t>
+            </a:r>
+            <a:r>
+              <a:rPr lang="en-US" sz="1800" u="sng" dirty="0" smtClean="0"/>
+              <a:t>entity sets, relationship sets</a:t>
+            </a:r>
+            <a:r>
+              <a:rPr lang="en-US" sz="1800" dirty="0" smtClean="0"/>
+              <a:t>, </a:t>
+            </a:r>
+            <a:r>
+              <a:rPr lang="en-US" sz="1800" u="sng" dirty="0" smtClean="0"/>
+              <a:t>and attributes</a:t>
+            </a:r>
+            <a:r>
+              <a:rPr lang="en-US" sz="1800" dirty="0" smtClean="0"/>
+              <a:t>,</a:t>
             </a:r>
           </a:p>
           <a:p>
@@ -9821,6 +11522,477 @@
   <p:clrMapOvr>
     <a:masterClrMapping/>
   </p:clrMapOvr>
+  <p:timing>
+    <p:tnLst>
+      <p:par>
+        <p:cTn id="1" dur="indefinite" restart="never" nodeType="tmRoot"/>
+      </p:par>
+    </p:tnLst>
+  </p:timing>
+</p:sld>
+</file>
+
+<file path=ppt/slides/slide40.xml><?xml version="1.0" encoding="utf-8"?>
+<p:sld xmlns:a="http://schemas.openxmlformats.org/drawingml/2006/main" xmlns:r="http://schemas.openxmlformats.org/officeDocument/2006/relationships" xmlns:p="http://schemas.openxmlformats.org/presentationml/2006/main">
+  <p:cSld>
+    <p:spTree>
+      <p:nvGrpSpPr>
+        <p:cNvPr id="1" name=""/>
+        <p:cNvGrpSpPr/>
+        <p:nvPr/>
+      </p:nvGrpSpPr>
+      <p:grpSpPr>
+        <a:xfrm>
+          <a:off x="0" y="0"/>
+          <a:ext cx="0" cy="0"/>
+          <a:chOff x="0" y="0"/>
+          <a:chExt cx="0" cy="0"/>
+        </a:xfrm>
+      </p:grpSpPr>
+      <p:sp>
+        <p:nvSpPr>
+          <p:cNvPr id="2" name="Title 1"/>
+          <p:cNvSpPr>
+            <a:spLocks noGrp="1"/>
+          </p:cNvSpPr>
+          <p:nvPr>
+            <p:ph type="title"/>
+          </p:nvPr>
+        </p:nvSpPr>
+        <p:spPr/>
+        <p:txBody>
+          <a:bodyPr>
+            <a:normAutofit/>
+          </a:bodyPr>
+          <a:lstStyle/>
+          <a:p>
+            <a:r>
+              <a:rPr lang="en-US" sz="3600" dirty="0"/>
+              <a:t>7.7.1 Use of Entity Sets versus Attributes</a:t>
+            </a:r>
+          </a:p>
+        </p:txBody>
+      </p:sp>
+      <p:sp>
+        <p:nvSpPr>
+          <p:cNvPr id="3" name="Content Placeholder 2"/>
+          <p:cNvSpPr>
+            <a:spLocks noGrp="1"/>
+          </p:cNvSpPr>
+          <p:nvPr>
+            <p:ph idx="1"/>
+          </p:nvPr>
+        </p:nvSpPr>
+        <p:spPr/>
+        <p:txBody>
+          <a:bodyPr>
+            <a:normAutofit/>
+          </a:bodyPr>
+          <a:lstStyle/>
+          <a:p>
+            <a:pPr algn="r" rtl="1"/>
+            <a:r>
+              <a:rPr lang="he-IL" sz="2000" dirty="0" smtClean="0"/>
+              <a:t>קטע זה בא לחדד שני דברים:</a:t>
+            </a:r>
+          </a:p>
+          <a:p>
+            <a:pPr algn="r" rtl="1"/>
+            <a:r>
+              <a:rPr lang="he-IL" sz="2000" dirty="0" smtClean="0"/>
+              <a:t>1</a:t>
+            </a:r>
+            <a:r>
+              <a:rPr lang="en-US" sz="2000" dirty="0" smtClean="0"/>
+              <a:t>. </a:t>
+            </a:r>
+            <a:r>
+              <a:rPr lang="he-IL" sz="2000" dirty="0"/>
+              <a:t> </a:t>
+            </a:r>
+            <a:r>
+              <a:rPr lang="he-IL" sz="2000" dirty="0" smtClean="0"/>
+              <a:t>יש מקרים שבהם טוב לקחת </a:t>
+            </a:r>
+            <a:r>
+              <a:rPr lang="en-US" sz="2000" dirty="0" smtClean="0"/>
+              <a:t>attribute </a:t>
+            </a:r>
+            <a:r>
+              <a:rPr lang="he-IL" sz="2000" dirty="0" smtClean="0"/>
+              <a:t> מסויים ולתת לו </a:t>
+            </a:r>
+            <a:r>
+              <a:rPr lang="en-US" sz="2000" dirty="0" smtClean="0"/>
+              <a:t>entity </a:t>
+            </a:r>
+            <a:r>
+              <a:rPr lang="he-IL" sz="2000" dirty="0"/>
+              <a:t> </a:t>
+            </a:r>
+            <a:r>
+              <a:rPr lang="he-IL" sz="2000" dirty="0" smtClean="0"/>
+              <a:t>משל עצמו בעיקר אם נוסף לו נתונים נוספים כמו בדוגמא אם מספרי הטלפון.</a:t>
+            </a:r>
+          </a:p>
+          <a:p>
+            <a:pPr algn="r" rtl="1"/>
+            <a:r>
+              <a:rPr lang="he-IL" sz="2000" dirty="0" smtClean="0"/>
+              <a:t>למשל רשומה של בתים למכירה והתמונות שלהם.  את התמונות כדי לשים בטבלה ניפרדת מכיוון שיכול להיות 0 או יותר תמונות לבית.</a:t>
+            </a:r>
+          </a:p>
+          <a:p>
+            <a:pPr algn="r" rtl="1"/>
+            <a:endParaRPr lang="he-IL" sz="2000" dirty="0"/>
+          </a:p>
+          <a:p>
+            <a:pPr algn="r" rtl="1"/>
+            <a:r>
+              <a:rPr lang="he-IL" sz="2000" dirty="0" smtClean="0"/>
+              <a:t>אין חוק שעוזר לנו לדעת מתי </a:t>
+            </a:r>
+            <a:r>
+              <a:rPr lang="en-US" sz="2000" dirty="0" smtClean="0"/>
+              <a:t>attribute </a:t>
+            </a:r>
+            <a:r>
+              <a:rPr lang="he-IL" sz="2000" dirty="0" smtClean="0"/>
+              <a:t> יהיה חלק מ ה </a:t>
+            </a:r>
+            <a:r>
+              <a:rPr lang="en-US" sz="2000" dirty="0" smtClean="0"/>
+              <a:t>entity set </a:t>
+            </a:r>
+            <a:r>
+              <a:rPr lang="he-IL" sz="2000" dirty="0" smtClean="0"/>
+              <a:t> ומתי יקבל אחד משלו.</a:t>
+            </a:r>
+          </a:p>
+          <a:p>
+            <a:pPr algn="r" rtl="1"/>
+            <a:r>
+              <a:rPr lang="he-IL" sz="2000" dirty="0" smtClean="0"/>
+              <a:t>דוגמאות כמו כמה מספרי טלפון, או מספר תמונות הן מצבים שבהם תהיה הפרדה</a:t>
+            </a:r>
+            <a:endParaRPr lang="en-US" sz="2000" dirty="0"/>
+          </a:p>
+        </p:txBody>
+      </p:sp>
+      <p:pic>
+        <p:nvPicPr>
+          <p:cNvPr id="5122" name="Picture 2"/>
+          <p:cNvPicPr>
+            <a:picLocks noChangeAspect="1" noChangeArrowheads="1"/>
+          </p:cNvPicPr>
+          <p:nvPr/>
+        </p:nvPicPr>
+        <p:blipFill>
+          <a:blip r:embed="rId2">
+            <a:extLst>
+              <a:ext uri="{28A0092B-C50C-407E-A947-70E740481C1C}">
+                <a14:useLocalDpi xmlns:a14="http://schemas.microsoft.com/office/drawing/2010/main" val="0"/>
+              </a:ext>
+            </a:extLst>
+          </a:blip>
+          <a:srcRect/>
+          <a:stretch>
+            <a:fillRect/>
+          </a:stretch>
+        </p:blipFill>
+        <p:spPr bwMode="auto">
+          <a:xfrm>
+            <a:off x="1219200" y="4648200"/>
+            <a:ext cx="4953000" cy="1866900"/>
+          </a:xfrm>
+          <a:prstGeom prst="rect">
+            <a:avLst/>
+          </a:prstGeom>
+          <a:noFill/>
+          <a:ln>
+            <a:noFill/>
+          </a:ln>
+          <a:effectLst/>
+          <a:extLst>
+            <a:ext uri="{909E8E84-426E-40DD-AFC4-6F175D3DCCD1}">
+              <a14:hiddenFill xmlns:a14="http://schemas.microsoft.com/office/drawing/2010/main">
+                <a:solidFill>
+                  <a:schemeClr val="accent1"/>
+                </a:solidFill>
+              </a14:hiddenFill>
+            </a:ext>
+            <a:ext uri="{91240B29-F687-4F45-9708-019B960494DF}">
+              <a14:hiddenLine xmlns:a14="http://schemas.microsoft.com/office/drawing/2010/main" w="9525">
+                <a:solidFill>
+                  <a:schemeClr val="tx1"/>
+                </a:solidFill>
+                <a:miter lim="800000"/>
+                <a:headEnd/>
+                <a:tailEnd/>
+              </a14:hiddenLine>
+            </a:ext>
+            <a:ext uri="{AF507438-7753-43E0-B8FC-AC1667EBCBE1}">
+              <a14:hiddenEffects xmlns:a14="http://schemas.microsoft.com/office/drawing/2010/main">
+                <a:effectLst>
+                  <a:outerShdw dist="35921" dir="2700000" algn="ctr" rotWithShape="0">
+                    <a:schemeClr val="bg2"/>
+                  </a:outerShdw>
+                </a:effectLst>
+              </a14:hiddenEffects>
+            </a:ext>
+          </a:extLst>
+        </p:spPr>
+      </p:pic>
+    </p:spTree>
+    <p:extLst>
+      <p:ext uri="{BB962C8B-B14F-4D97-AF65-F5344CB8AC3E}">
+        <p14:creationId xmlns:p14="http://schemas.microsoft.com/office/powerpoint/2010/main" val="583254367"/>
+      </p:ext>
+    </p:extLst>
+  </p:cSld>
+  <p:clrMapOvr>
+    <a:masterClrMapping/>
+  </p:clrMapOvr>
+  <p:timing>
+    <p:tnLst>
+      <p:par>
+        <p:cTn id="1" dur="indefinite" restart="never" nodeType="tmRoot"/>
+      </p:par>
+    </p:tnLst>
+  </p:timing>
+</p:sld>
+</file>
+
+<file path=ppt/slides/slide41.xml><?xml version="1.0" encoding="utf-8"?>
+<p:sld xmlns:a="http://schemas.openxmlformats.org/drawingml/2006/main" xmlns:r="http://schemas.openxmlformats.org/officeDocument/2006/relationships" xmlns:p="http://schemas.openxmlformats.org/presentationml/2006/main">
+  <p:cSld>
+    <p:spTree>
+      <p:nvGrpSpPr>
+        <p:cNvPr id="1" name=""/>
+        <p:cNvGrpSpPr/>
+        <p:nvPr/>
+      </p:nvGrpSpPr>
+      <p:grpSpPr>
+        <a:xfrm>
+          <a:off x="0" y="0"/>
+          <a:ext cx="0" cy="0"/>
+          <a:chOff x="0" y="0"/>
+          <a:chExt cx="0" cy="0"/>
+        </a:xfrm>
+      </p:grpSpPr>
+      <p:sp>
+        <p:nvSpPr>
+          <p:cNvPr id="2" name="Title 1"/>
+          <p:cNvSpPr>
+            <a:spLocks noGrp="1"/>
+          </p:cNvSpPr>
+          <p:nvPr>
+            <p:ph type="title"/>
+          </p:nvPr>
+        </p:nvSpPr>
+        <p:spPr/>
+        <p:txBody>
+          <a:bodyPr>
+            <a:normAutofit/>
+          </a:bodyPr>
+          <a:lstStyle/>
+          <a:p>
+            <a:r>
+              <a:rPr lang="en-US" sz="3600" dirty="0"/>
+              <a:t>7.7.3 Binary versus n-</a:t>
+            </a:r>
+            <a:r>
+              <a:rPr lang="en-US" sz="3600" dirty="0" err="1"/>
+              <a:t>ary</a:t>
+            </a:r>
+            <a:r>
+              <a:rPr lang="en-US" sz="3600" dirty="0"/>
+              <a:t> Relationship Sets</a:t>
+            </a:r>
+          </a:p>
+        </p:txBody>
+      </p:sp>
+      <p:sp>
+        <p:nvSpPr>
+          <p:cNvPr id="3" name="Content Placeholder 2"/>
+          <p:cNvSpPr>
+            <a:spLocks noGrp="1"/>
+          </p:cNvSpPr>
+          <p:nvPr>
+            <p:ph idx="1"/>
+          </p:nvPr>
+        </p:nvSpPr>
+        <p:spPr/>
+        <p:txBody>
+          <a:bodyPr/>
+          <a:lstStyle/>
+          <a:p>
+            <a:pPr algn="r" rtl="1"/>
+            <a:r>
+              <a:rPr lang="he-IL" dirty="0" smtClean="0"/>
+              <a:t>הייתי אומר לא ללכת על שיטה או דרך </a:t>
+            </a:r>
+          </a:p>
+          <a:p>
+            <a:pPr algn="r" rtl="1"/>
+            <a:r>
+              <a:rPr lang="he-IL" dirty="0" smtClean="0"/>
+              <a:t>לרוב עדיף שיהיה יחס בינארי אבל גם יותר זה אפשרי , רק כדאי לשים לב האם אפשר לתאר את ה סכמה באמצעות שני </a:t>
+            </a:r>
+            <a:r>
+              <a:rPr lang="en-US" dirty="0" smtClean="0"/>
+              <a:t>entity </a:t>
+            </a:r>
+            <a:r>
+              <a:rPr lang="he-IL" dirty="0" smtClean="0"/>
+              <a:t> במקום שלוש </a:t>
+            </a:r>
+          </a:p>
+          <a:p>
+            <a:pPr algn="r" rtl="1"/>
+            <a:r>
+              <a:rPr lang="he-IL" dirty="0" smtClean="0"/>
+              <a:t>לפעמים אי אפשר וצריך יותר</a:t>
+            </a:r>
+            <a:endParaRPr lang="en-US" dirty="0"/>
+          </a:p>
+        </p:txBody>
+      </p:sp>
+    </p:spTree>
+    <p:extLst>
+      <p:ext uri="{BB962C8B-B14F-4D97-AF65-F5344CB8AC3E}">
+        <p14:creationId xmlns:p14="http://schemas.microsoft.com/office/powerpoint/2010/main" val="1350038077"/>
+      </p:ext>
+    </p:extLst>
+  </p:cSld>
+  <p:clrMapOvr>
+    <a:masterClrMapping/>
+  </p:clrMapOvr>
+  <p:timing>
+    <p:tnLst>
+      <p:par>
+        <p:cTn id="1" dur="indefinite" restart="never" nodeType="tmRoot"/>
+      </p:par>
+    </p:tnLst>
+  </p:timing>
+</p:sld>
+</file>
+
+<file path=ppt/slides/slide42.xml><?xml version="1.0" encoding="utf-8"?>
+<p:sld xmlns:a="http://schemas.openxmlformats.org/drawingml/2006/main" xmlns:r="http://schemas.openxmlformats.org/officeDocument/2006/relationships" xmlns:p="http://schemas.openxmlformats.org/presentationml/2006/main">
+  <p:cSld>
+    <p:spTree>
+      <p:nvGrpSpPr>
+        <p:cNvPr id="1" name=""/>
+        <p:cNvGrpSpPr/>
+        <p:nvPr/>
+      </p:nvGrpSpPr>
+      <p:grpSpPr>
+        <a:xfrm>
+          <a:off x="0" y="0"/>
+          <a:ext cx="0" cy="0"/>
+          <a:chOff x="0" y="0"/>
+          <a:chExt cx="0" cy="0"/>
+        </a:xfrm>
+      </p:grpSpPr>
+      <p:sp>
+        <p:nvSpPr>
+          <p:cNvPr id="2" name="Title 1"/>
+          <p:cNvSpPr>
+            <a:spLocks noGrp="1"/>
+          </p:cNvSpPr>
+          <p:nvPr>
+            <p:ph type="title"/>
+          </p:nvPr>
+        </p:nvSpPr>
+        <p:spPr/>
+        <p:txBody>
+          <a:bodyPr/>
+          <a:lstStyle/>
+          <a:p>
+            <a:r>
+              <a:rPr lang="he-IL" dirty="0" smtClean="0"/>
+              <a:t>מקורות נוספים</a:t>
+            </a:r>
+            <a:endParaRPr lang="en-US" dirty="0"/>
+          </a:p>
+        </p:txBody>
+      </p:sp>
+      <p:sp>
+        <p:nvSpPr>
+          <p:cNvPr id="3" name="Content Placeholder 2"/>
+          <p:cNvSpPr>
+            <a:spLocks noGrp="1"/>
+          </p:cNvSpPr>
+          <p:nvPr>
+            <p:ph idx="1"/>
+          </p:nvPr>
+        </p:nvSpPr>
+        <p:spPr/>
+        <p:txBody>
+          <a:bodyPr/>
+          <a:lstStyle/>
+          <a:p>
+            <a:pPr algn="l"/>
+            <a:r>
+              <a:rPr lang="en-US" dirty="0" smtClean="0">
+                <a:hlinkClick r:id="rId2"/>
+              </a:rPr>
+              <a:t>Good power point </a:t>
+            </a:r>
+            <a:r>
+              <a:rPr lang="en-US" dirty="0" smtClean="0">
+                <a:hlinkClick r:id="rId2"/>
+              </a:rPr>
+              <a:t>presentation</a:t>
+            </a:r>
+            <a:endParaRPr lang="he-IL" dirty="0" smtClean="0"/>
+          </a:p>
+          <a:p>
+            <a:pPr algn="r" rtl="1"/>
+            <a:r>
+              <a:rPr lang="he-IL" sz="1800" dirty="0" smtClean="0"/>
+              <a:t>המצג הבא מאד דומה למצג מהמספר , הוא בעברית. נשים לב שהדיאגרמה משורטטת שונה , עם עיגולים של תכונות ולא בתוך המלבן</a:t>
+            </a:r>
+            <a:endParaRPr lang="he-IL" sz="1800" dirty="0"/>
+          </a:p>
+          <a:p>
+            <a:r>
+              <a:rPr lang="en-US" sz="1600" dirty="0">
+                <a:hlinkClick r:id="rId3"/>
+              </a:rPr>
+              <a:t>http://</a:t>
+            </a:r>
+            <a:r>
+              <a:rPr lang="en-US" sz="1600" dirty="0" smtClean="0">
+                <a:hlinkClick r:id="rId3"/>
+              </a:rPr>
+              <a:t>webcourse.cs.technion.ac.il/236363/Spring2011/ho/WCFiles/236363_ERD.ppt</a:t>
+            </a:r>
+            <a:endParaRPr lang="he-IL" sz="1600" dirty="0" smtClean="0"/>
+          </a:p>
+          <a:p>
+            <a:endParaRPr lang="en-US" sz="1600" dirty="0"/>
+          </a:p>
+        </p:txBody>
+      </p:sp>
+    </p:spTree>
+    <p:extLst>
+      <p:ext uri="{BB962C8B-B14F-4D97-AF65-F5344CB8AC3E}">
+        <p14:creationId xmlns:p14="http://schemas.microsoft.com/office/powerpoint/2010/main" val="3498318727"/>
+      </p:ext>
+    </p:extLst>
+  </p:cSld>
+  <p:clrMapOvr>
+    <a:masterClrMapping/>
+  </p:clrMapOvr>
+  <p:timing>
+    <p:tnLst>
+      <p:par>
+        <p:cTn id="1" dur="indefinite" restart="never" nodeType="tmRoot"/>
+      </p:par>
+    </p:tnLst>
+  </p:timing>
 </p:sld>
 </file>
 
@@ -10096,7 +12268,12 @@
             <p:ph idx="1"/>
           </p:nvPr>
         </p:nvSpPr>
-        <p:spPr/>
+        <p:spPr>
+          <a:xfrm>
+            <a:off x="457200" y="1600200"/>
+            <a:ext cx="8458200" cy="5094577"/>
+          </a:xfrm>
+        </p:spPr>
         <p:txBody>
           <a:bodyPr/>
           <a:lstStyle/>
@@ -10141,6 +12318,70 @@
           </a:p>
         </p:txBody>
       </p:sp>
+      <p:pic>
+        <p:nvPicPr>
+          <p:cNvPr id="6146" name="Picture 2"/>
+          <p:cNvPicPr>
+            <a:picLocks noChangeAspect="1" noChangeArrowheads="1"/>
+          </p:cNvPicPr>
+          <p:nvPr/>
+        </p:nvPicPr>
+        <p:blipFill>
+          <a:blip r:embed="rId2">
+            <a:extLst>
+              <a:ext uri="{28A0092B-C50C-407E-A947-70E740481C1C}">
+                <a14:useLocalDpi xmlns:a14="http://schemas.microsoft.com/office/drawing/2010/main" val="0"/>
+              </a:ext>
+            </a:extLst>
+          </a:blip>
+          <a:srcRect/>
+          <a:stretch>
+            <a:fillRect/>
+          </a:stretch>
+        </p:blipFill>
+        <p:spPr bwMode="auto">
+          <a:xfrm>
+            <a:off x="3429000" y="4607699"/>
+            <a:ext cx="5619750" cy="2087078"/>
+          </a:xfrm>
+          <a:prstGeom prst="rect">
+            <a:avLst/>
+          </a:prstGeom>
+          <a:noFill/>
+          <a:ln>
+            <a:noFill/>
+          </a:ln>
+          <a:effectLst/>
+          <a:extLst>
+            <a:ext uri="{909E8E84-426E-40DD-AFC4-6F175D3DCCD1}">
+              <a14:hiddenFill xmlns:a14="http://schemas.microsoft.com/office/drawing/2010/main">
+                <a:solidFill>
+                  <a:schemeClr val="accent1"/>
+                </a:solidFill>
+              </a14:hiddenFill>
+            </a:ext>
+            <a:ext uri="{91240B29-F687-4F45-9708-019B960494DF}">
+              <a14:hiddenLine xmlns:a14="http://schemas.microsoft.com/office/drawing/2010/main" w="9525">
+                <a:solidFill>
+                  <a:schemeClr val="tx1"/>
+                </a:solidFill>
+                <a:miter lim="800000"/>
+                <a:headEnd/>
+                <a:tailEnd/>
+              </a14:hiddenLine>
+            </a:ext>
+            <a:ext uri="{AF507438-7753-43E0-B8FC-AC1667EBCBE1}">
+              <a14:hiddenEffects xmlns:a14="http://schemas.microsoft.com/office/drawing/2010/main">
+                <a:effectLst>
+                  <a:outerShdw dist="35921" dir="2700000" algn="ctr" rotWithShape="0">
+                    <a:schemeClr val="bg2"/>
+                  </a:outerShdw>
+                </a:effectLst>
+              </a14:hiddenEffects>
+            </a:ext>
+          </a:extLst>
+        </p:spPr>
+      </p:pic>
     </p:spTree>
     <p:extLst>
       <p:ext uri="{BB962C8B-B14F-4D97-AF65-F5344CB8AC3E}">
@@ -10237,25 +12478,45 @@
             </a:r>
           </a:p>
           <a:p>
-            <a:pPr algn="r" rtl="1"/>
+            <a:pPr marL="0" indent="0" algn="r" rtl="1">
+              <a:buNone/>
+            </a:pPr>
             <a:r>
               <a:rPr lang="he-IL" sz="1600" dirty="0" smtClean="0"/>
-              <a:t>מבנה נתונים והם בעיקר הטבלאות הדינמיות </a:t>
-            </a:r>
-          </a:p>
-          <a:p>
-            <a:pPr algn="r" rtl="1"/>
+              <a:t>      מבנה </a:t>
+            </a:r>
             <a:r>
               <a:rPr lang="he-IL" sz="1600" dirty="0" smtClean="0"/>
-              <a:t>שמשתמש מזין להם מידע יומיומי אפילו כל כמה</a:t>
-            </a:r>
-          </a:p>
-          <a:p>
-            <a:pPr algn="r" rtl="1"/>
+              <a:t>נתונים והם בעיקר הטבלאות הדינמיות </a:t>
+            </a:r>
+          </a:p>
+          <a:p>
+            <a:pPr marL="0" indent="0" algn="r" rtl="1">
+              <a:buNone/>
+            </a:pPr>
             <a:r>
               <a:rPr lang="he-IL" sz="1600" dirty="0" smtClean="0"/>
-              <a:t>שניות.</a:t>
-            </a:r>
+              <a:t>      שמשתמש </a:t>
+            </a:r>
+            <a:r>
+              <a:rPr lang="he-IL" sz="1600" dirty="0" smtClean="0"/>
+              <a:t>מזין להם מידע יומיומי אפילו כל </a:t>
+            </a:r>
+            <a:r>
+              <a:rPr lang="he-IL" sz="1600" dirty="0" smtClean="0"/>
+              <a:t>כמה  </a:t>
+            </a:r>
+            <a:endParaRPr lang="he-IL" sz="1600" dirty="0" smtClean="0"/>
+          </a:p>
+          <a:p>
+            <a:pPr marL="0" indent="0" algn="r" rtl="1">
+              <a:buNone/>
+            </a:pPr>
+            <a:r>
+              <a:rPr lang="he-IL" sz="1600" dirty="0" smtClean="0"/>
+              <a:t>      שניות. </a:t>
+            </a:r>
+            <a:endParaRPr lang="he-IL" sz="1600" dirty="0" smtClean="0"/>
           </a:p>
           <a:p>
             <a:pPr algn="r" rtl="1"/>
@@ -10434,6 +12695,13 @@
   <p:clrMapOvr>
     <a:masterClrMapping/>
   </p:clrMapOvr>
+  <p:timing>
+    <p:tnLst>
+      <p:par>
+        <p:cTn id="1" dur="indefinite" restart="never" nodeType="tmRoot"/>
+      </p:par>
+    </p:tnLst>
+  </p:timing>
 </p:sld>
 </file>
 
@@ -10707,8 +12975,24 @@
             </a:r>
             <a:r>
               <a:rPr lang="he-IL" dirty="0" smtClean="0"/>
-              <a:t> ואם לא אז הם וירטואלים עד אשר מוסיפים טבלה כזו.</a:t>
-            </a:r>
+              <a:t> ואם לא אז הם וירטואלים עד אשר מוסיפים טבלה כזו</a:t>
+            </a:r>
+            <a:r>
+              <a:rPr lang="he-IL" dirty="0" smtClean="0"/>
+              <a:t>.</a:t>
+            </a:r>
+          </a:p>
+          <a:p>
+            <a:pPr algn="r" rtl="1"/>
+            <a:r>
+              <a:rPr lang="en-US" dirty="0" smtClean="0"/>
+              <a:t>RS</a:t>
+            </a:r>
+            <a:r>
+              <a:rPr lang="he-IL" dirty="0" smtClean="0"/>
+              <a:t> יכול להיות מיותר או מאוחד עם טבלה</a:t>
+            </a:r>
+            <a:endParaRPr lang="he-IL" dirty="0" smtClean="0"/>
           </a:p>
           <a:p>
             <a:pPr marL="0" indent="0" algn="r" rtl="1">

</xml_diff>